<commit_message>
Update presentation, create speech template
</commit_message>
<xml_diff>
--- a/Final/Presentation.pptx
+++ b/Final/Presentation.pptx
@@ -6,16 +6,18 @@
   </p:sldMasterIdLst>
   <p:sldIdLst>
     <p:sldId id="256" r:id="rId2"/>
-    <p:sldId id="260" r:id="rId3"/>
-    <p:sldId id="261" r:id="rId4"/>
-    <p:sldId id="257" r:id="rId5"/>
-    <p:sldId id="258" r:id="rId6"/>
-    <p:sldId id="262" r:id="rId7"/>
-    <p:sldId id="264" r:id="rId8"/>
-    <p:sldId id="263" r:id="rId9"/>
-    <p:sldId id="265" r:id="rId10"/>
-    <p:sldId id="266" r:id="rId11"/>
-    <p:sldId id="259" r:id="rId12"/>
+    <p:sldId id="267" r:id="rId3"/>
+    <p:sldId id="268" r:id="rId4"/>
+    <p:sldId id="260" r:id="rId5"/>
+    <p:sldId id="261" r:id="rId6"/>
+    <p:sldId id="257" r:id="rId7"/>
+    <p:sldId id="258" r:id="rId8"/>
+    <p:sldId id="262" r:id="rId9"/>
+    <p:sldId id="264" r:id="rId10"/>
+    <p:sldId id="263" r:id="rId11"/>
+    <p:sldId id="265" r:id="rId12"/>
+    <p:sldId id="266" r:id="rId13"/>
+    <p:sldId id="259" r:id="rId14"/>
   </p:sldIdLst>
   <p:sldSz cx="12192000" cy="6858000"/>
   <p:notesSz cx="6858000" cy="9144000"/>
@@ -277,7 +279,6 @@
               <c:extLst>
                 <c:ext xmlns:c15="http://schemas.microsoft.com/office/drawing/2012/chart" uri="{CE6537A1-D6FC-4f65-9D91-7224C49458BB}">
                   <c15:dlblFieldTable/>
-                  <c15:xForSave val="1"/>
                   <c15:showDataLabelsRange val="1"/>
                 </c:ext>
                 <c:ext xmlns:c16="http://schemas.microsoft.com/office/drawing/2014/chart" uri="{C3380CC4-5D6E-409C-BE32-E72D297353CC}">
@@ -320,7 +321,6 @@
               <c:extLst>
                 <c:ext xmlns:c15="http://schemas.microsoft.com/office/drawing/2012/chart" uri="{CE6537A1-D6FC-4f65-9D91-7224C49458BB}">
                   <c15:dlblFieldTable/>
-                  <c15:xForSave val="1"/>
                   <c15:showDataLabelsRange val="1"/>
                 </c:ext>
                 <c:ext xmlns:c16="http://schemas.microsoft.com/office/drawing/2014/chart" uri="{C3380CC4-5D6E-409C-BE32-E72D297353CC}">
@@ -690,15 +690,15 @@
                   <a:lstStyle/>
                   <a:p>
                     <a:fld id="{C2C8D079-6F13-44F5-B503-5A56555A5F5A}" type="CELLRANGE">
-                      <a:rPr lang="ru-BY"/>
+                      <a:rPr lang="en-US"/>
                       <a:pPr/>
                       <a:t>[ДИАПАЗОН ЯЧЕЕК]</a:t>
                     </a:fld>
-                    <a:endParaRPr lang="ru-BY" baseline="0"/>
+                    <a:endParaRPr lang="en-US" baseline="0"/>
                   </a:p>
                   <a:p>
                     <a:fld id="{994DFBBC-E429-4AD3-BFE6-84E2763F5613}" type="PERCENTAGE">
-                      <a:rPr lang="ru-BY"/>
+                      <a:rPr lang="en-US"/>
                       <a:pPr/>
                       <a:t>[ПРОЦЕНТ]</a:t>
                     </a:fld>
@@ -717,7 +717,6 @@
               <c:extLst>
                 <c:ext xmlns:c15="http://schemas.microsoft.com/office/drawing/2012/chart" uri="{CE6537A1-D6FC-4f65-9D91-7224C49458BB}">
                   <c15:dlblFieldTable/>
-                  <c15:xForSave val="1"/>
                   <c15:showDataLabelsRange val="1"/>
                 </c:ext>
                 <c:ext xmlns:c16="http://schemas.microsoft.com/office/drawing/2014/chart" uri="{C3380CC4-5D6E-409C-BE32-E72D297353CC}">
@@ -3478,7 +3477,7 @@
           <a:p>
             <a:fld id="{3D86E8B6-8EEC-4635-974A-66DABC2AC418}" type="datetimeFigureOut">
               <a:rPr lang="ru-BY" smtClean="0"/>
-              <a:t>19.06.2021</a:t>
+              <a:t>20.06.2021</a:t>
             </a:fld>
             <a:endParaRPr lang="ru-BY"/>
           </a:p>
@@ -3678,7 +3677,7 @@
           <a:p>
             <a:fld id="{3D86E8B6-8EEC-4635-974A-66DABC2AC418}" type="datetimeFigureOut">
               <a:rPr lang="ru-BY" smtClean="0"/>
-              <a:t>19.06.2021</a:t>
+              <a:t>20.06.2021</a:t>
             </a:fld>
             <a:endParaRPr lang="ru-BY"/>
           </a:p>
@@ -3888,7 +3887,7 @@
           <a:p>
             <a:fld id="{3D86E8B6-8EEC-4635-974A-66DABC2AC418}" type="datetimeFigureOut">
               <a:rPr lang="ru-BY" smtClean="0"/>
-              <a:t>19.06.2021</a:t>
+              <a:t>20.06.2021</a:t>
             </a:fld>
             <a:endParaRPr lang="ru-BY"/>
           </a:p>
@@ -4088,7 +4087,7 @@
           <a:p>
             <a:fld id="{3D86E8B6-8EEC-4635-974A-66DABC2AC418}" type="datetimeFigureOut">
               <a:rPr lang="ru-BY" smtClean="0"/>
-              <a:t>19.06.2021</a:t>
+              <a:t>20.06.2021</a:t>
             </a:fld>
             <a:endParaRPr lang="ru-BY"/>
           </a:p>
@@ -4364,7 +4363,7 @@
           <a:p>
             <a:fld id="{3D86E8B6-8EEC-4635-974A-66DABC2AC418}" type="datetimeFigureOut">
               <a:rPr lang="ru-BY" smtClean="0"/>
-              <a:t>19.06.2021</a:t>
+              <a:t>20.06.2021</a:t>
             </a:fld>
             <a:endParaRPr lang="ru-BY"/>
           </a:p>
@@ -4632,7 +4631,7 @@
           <a:p>
             <a:fld id="{3D86E8B6-8EEC-4635-974A-66DABC2AC418}" type="datetimeFigureOut">
               <a:rPr lang="ru-BY" smtClean="0"/>
-              <a:t>19.06.2021</a:t>
+              <a:t>20.06.2021</a:t>
             </a:fld>
             <a:endParaRPr lang="ru-BY"/>
           </a:p>
@@ -5047,7 +5046,7 @@
           <a:p>
             <a:fld id="{3D86E8B6-8EEC-4635-974A-66DABC2AC418}" type="datetimeFigureOut">
               <a:rPr lang="ru-BY" smtClean="0"/>
-              <a:t>19.06.2021</a:t>
+              <a:t>20.06.2021</a:t>
             </a:fld>
             <a:endParaRPr lang="ru-BY"/>
           </a:p>
@@ -5189,7 +5188,7 @@
           <a:p>
             <a:fld id="{3D86E8B6-8EEC-4635-974A-66DABC2AC418}" type="datetimeFigureOut">
               <a:rPr lang="ru-BY" smtClean="0"/>
-              <a:t>19.06.2021</a:t>
+              <a:t>20.06.2021</a:t>
             </a:fld>
             <a:endParaRPr lang="ru-BY"/>
           </a:p>
@@ -5302,7 +5301,7 @@
           <a:p>
             <a:fld id="{3D86E8B6-8EEC-4635-974A-66DABC2AC418}" type="datetimeFigureOut">
               <a:rPr lang="ru-BY" smtClean="0"/>
-              <a:t>19.06.2021</a:t>
+              <a:t>20.06.2021</a:t>
             </a:fld>
             <a:endParaRPr lang="ru-BY"/>
           </a:p>
@@ -5615,7 +5614,7 @@
           <a:p>
             <a:fld id="{3D86E8B6-8EEC-4635-974A-66DABC2AC418}" type="datetimeFigureOut">
               <a:rPr lang="ru-BY" smtClean="0"/>
-              <a:t>19.06.2021</a:t>
+              <a:t>20.06.2021</a:t>
             </a:fld>
             <a:endParaRPr lang="ru-BY"/>
           </a:p>
@@ -5904,7 +5903,7 @@
           <a:p>
             <a:fld id="{3D86E8B6-8EEC-4635-974A-66DABC2AC418}" type="datetimeFigureOut">
               <a:rPr lang="ru-BY" smtClean="0"/>
-              <a:t>19.06.2021</a:t>
+              <a:t>20.06.2021</a:t>
             </a:fld>
             <a:endParaRPr lang="ru-BY"/>
           </a:p>
@@ -6147,7 +6146,7 @@
           <a:p>
             <a:fld id="{3D86E8B6-8EEC-4635-974A-66DABC2AC418}" type="datetimeFigureOut">
               <a:rPr lang="ru-BY" smtClean="0"/>
-              <a:t>19.06.2021</a:t>
+              <a:t>20.06.2021</a:t>
             </a:fld>
             <a:endParaRPr lang="ru-BY"/>
           </a:p>
@@ -6587,17 +6586,19 @@
           </a:xfrm>
         </p:spPr>
         <p:txBody>
-          <a:bodyPr/>
+          <a:bodyPr>
+            <a:normAutofit/>
+          </a:bodyPr>
           <a:lstStyle/>
           <a:p>
             <a:r>
-              <a:rPr lang="ru-RU" dirty="0">
+              <a:rPr lang="ru-RU" sz="5400" dirty="0">
                 <a:latin typeface="JetBrains Mono" panose="020B0509020102050004" pitchFamily="49" charset="-52"/>
                 <a:cs typeface="Times New Roman" panose="02020603050405020304" pitchFamily="18" charset="0"/>
               </a:rPr>
               <a:t>Презентация дипломного проекта</a:t>
             </a:r>
-            <a:endParaRPr lang="ru-BY" dirty="0">
+            <a:endParaRPr lang="ru-BY" sz="5400" dirty="0">
               <a:latin typeface="JetBrains Mono" panose="020B0509020102050004" pitchFamily="49" charset="-52"/>
               <a:cs typeface="Times New Roman" panose="02020603050405020304" pitchFamily="18" charset="0"/>
             </a:endParaRPr>
@@ -6660,7 +6661,7 @@
         </p:nvSpPr>
         <p:spPr>
           <a:xfrm>
-            <a:off x="7822317" y="5995862"/>
+            <a:off x="7629483" y="5641300"/>
             <a:ext cx="3980520" cy="862138"/>
           </a:xfrm>
           <a:prstGeom prst="rect">
@@ -6842,27 +6843,45 @@
                 <a:latin typeface="JetBrains Mono" panose="020B0509020102050004" pitchFamily="49" charset="-52"/>
                 <a:cs typeface="Times New Roman" panose="02020603050405020304" pitchFamily="18" charset="0"/>
               </a:rPr>
-              <a:t>студент группы 750701</a:t>
-            </a:r>
-            <a:br>
+              <a:t>Выполнил: </a:t>
+            </a:r>
+            <a:r>
+              <a:rPr lang="ru-RU" sz="1800" dirty="0" err="1">
+                <a:latin typeface="JetBrains Mono" panose="020B0509020102050004" pitchFamily="49" charset="-52"/>
+                <a:cs typeface="Times New Roman" panose="02020603050405020304" pitchFamily="18" charset="0"/>
+              </a:rPr>
+              <a:t>Миронь</a:t>
+            </a:r>
+            <a:r>
               <a:rPr lang="ru-RU" sz="1800" dirty="0">
                 <a:latin typeface="JetBrains Mono" panose="020B0509020102050004" pitchFamily="49" charset="-52"/>
                 <a:cs typeface="Times New Roman" panose="02020603050405020304" pitchFamily="18" charset="0"/>
               </a:rPr>
-            </a:br>
+              <a:t> А.В.</a:t>
+            </a:r>
+          </a:p>
+          <a:p>
+            <a:pPr algn="r"/>
+            <a:r>
+              <a:rPr lang="ru-RU" sz="1800" dirty="0">
+                <a:latin typeface="JetBrains Mono" panose="020B0509020102050004" pitchFamily="49" charset="-52"/>
+                <a:cs typeface="Times New Roman" panose="02020603050405020304" pitchFamily="18" charset="0"/>
+              </a:rPr>
+              <a:t>Руководитель: </a:t>
+            </a:r>
             <a:r>
               <a:rPr lang="ru-RU" sz="1800" dirty="0" err="1">
                 <a:latin typeface="JetBrains Mono" panose="020B0509020102050004" pitchFamily="49" charset="-52"/>
                 <a:cs typeface="Times New Roman" panose="02020603050405020304" pitchFamily="18" charset="0"/>
               </a:rPr>
-              <a:t>Миронь</a:t>
+              <a:t>Шемаров</a:t>
             </a:r>
             <a:r>
               <a:rPr lang="ru-RU" sz="1800" dirty="0">
                 <a:latin typeface="JetBrains Mono" panose="020B0509020102050004" pitchFamily="49" charset="-52"/>
                 <a:cs typeface="Times New Roman" panose="02020603050405020304" pitchFamily="18" charset="0"/>
               </a:rPr>
-              <a:t> А. В.</a:t>
+              <a:t> А.И.</a:t>
             </a:r>
             <a:endParaRPr lang="ru-BY" sz="1800" dirty="0">
               <a:latin typeface="JetBrains Mono" panose="020B0509020102050004" pitchFamily="49" charset="-52"/>
@@ -6906,6 +6925,476 @@
           <p:cNvPr id="2" name="Заголовок 1">
             <a:extLst>
               <a:ext uri="{FF2B5EF4-FFF2-40B4-BE49-F238E27FC236}">
+                <a16:creationId xmlns:a16="http://schemas.microsoft.com/office/drawing/2014/main" id="{87F6B156-2943-46BF-B7D0-570620BB150D}"/>
+              </a:ext>
+            </a:extLst>
+          </p:cNvPr>
+          <p:cNvSpPr>
+            <a:spLocks noGrp="1"/>
+          </p:cNvSpPr>
+          <p:nvPr>
+            <p:ph type="title"/>
+          </p:nvPr>
+        </p:nvSpPr>
+        <p:spPr>
+          <a:xfrm>
+            <a:off x="838200" y="113198"/>
+            <a:ext cx="10515600" cy="1325563"/>
+          </a:xfrm>
+        </p:spPr>
+        <p:txBody>
+          <a:bodyPr/>
+          <a:lstStyle/>
+          <a:p>
+            <a:pPr algn="ctr"/>
+            <a:r>
+              <a:rPr lang="ru-RU" dirty="0">
+                <a:latin typeface="JetBrains Mono" panose="020B0509020102050004" pitchFamily="49" charset="-52"/>
+              </a:rPr>
+              <a:t>Моделирование работы системы</a:t>
+            </a:r>
+            <a:endParaRPr lang="ru-BY" dirty="0">
+              <a:latin typeface="JetBrains Mono" panose="020B0509020102050004" pitchFamily="49" charset="-52"/>
+            </a:endParaRPr>
+          </a:p>
+        </p:txBody>
+      </p:sp>
+      <p:pic>
+        <p:nvPicPr>
+          <p:cNvPr id="5" name="Рисунок 4">
+            <a:extLst>
+              <a:ext uri="{FF2B5EF4-FFF2-40B4-BE49-F238E27FC236}">
+                <a16:creationId xmlns:a16="http://schemas.microsoft.com/office/drawing/2014/main" id="{54218F4D-B5F5-4837-80DE-7411E334895F}"/>
+              </a:ext>
+            </a:extLst>
+          </p:cNvPr>
+          <p:cNvPicPr>
+            <a:picLocks noChangeAspect="1"/>
+          </p:cNvPicPr>
+          <p:nvPr/>
+        </p:nvPicPr>
+        <p:blipFill>
+          <a:blip r:embed="rId2"/>
+          <a:stretch>
+            <a:fillRect/>
+          </a:stretch>
+        </p:blipFill>
+        <p:spPr>
+          <a:xfrm>
+            <a:off x="457931" y="2454113"/>
+            <a:ext cx="5380611" cy="3684176"/>
+          </a:xfrm>
+          <a:prstGeom prst="rect">
+            <a:avLst/>
+          </a:prstGeom>
+        </p:spPr>
+      </p:pic>
+      <p:sp>
+        <p:nvSpPr>
+          <p:cNvPr id="8" name="TextBox 7">
+            <a:extLst>
+              <a:ext uri="{FF2B5EF4-FFF2-40B4-BE49-F238E27FC236}">
+                <a16:creationId xmlns:a16="http://schemas.microsoft.com/office/drawing/2014/main" id="{EAD4675A-0A94-453E-BEBA-398B1CBBCF78}"/>
+              </a:ext>
+            </a:extLst>
+          </p:cNvPr>
+          <p:cNvSpPr txBox="1"/>
+          <p:nvPr/>
+        </p:nvSpPr>
+        <p:spPr>
+          <a:xfrm>
+            <a:off x="1135268" y="1543051"/>
+            <a:ext cx="6097554" cy="588238"/>
+          </a:xfrm>
+          <a:prstGeom prst="rect">
+            <a:avLst/>
+          </a:prstGeom>
+          <a:noFill/>
+        </p:spPr>
+        <p:txBody>
+          <a:bodyPr wrap="square">
+            <a:spAutoFit/>
+          </a:bodyPr>
+          <a:lstStyle/>
+          <a:p>
+            <a:pPr>
+              <a:lnSpc>
+                <a:spcPct val="150000"/>
+              </a:lnSpc>
+            </a:pPr>
+            <a:r>
+              <a:rPr lang="ru-RU" sz="2400" dirty="0">
+                <a:latin typeface="JetBrains Mono" panose="020B0509020102050004" pitchFamily="49" charset="-52"/>
+              </a:rPr>
+              <a:t>Ввод номера телефона</a:t>
+            </a:r>
+          </a:p>
+        </p:txBody>
+      </p:sp>
+      <p:sp>
+        <p:nvSpPr>
+          <p:cNvPr id="13" name="TextBox 12">
+            <a:extLst>
+              <a:ext uri="{FF2B5EF4-FFF2-40B4-BE49-F238E27FC236}">
+                <a16:creationId xmlns:a16="http://schemas.microsoft.com/office/drawing/2014/main" id="{78070476-F7CE-44F3-BBD8-4A7D7DF3D8C9}"/>
+              </a:ext>
+            </a:extLst>
+          </p:cNvPr>
+          <p:cNvSpPr txBox="1"/>
+          <p:nvPr/>
+        </p:nvSpPr>
+        <p:spPr>
+          <a:xfrm>
+            <a:off x="7541827" y="1543051"/>
+            <a:ext cx="6097554" cy="588238"/>
+          </a:xfrm>
+          <a:prstGeom prst="rect">
+            <a:avLst/>
+          </a:prstGeom>
+          <a:noFill/>
+        </p:spPr>
+        <p:txBody>
+          <a:bodyPr wrap="square">
+            <a:spAutoFit/>
+          </a:bodyPr>
+          <a:lstStyle/>
+          <a:p>
+            <a:pPr>
+              <a:lnSpc>
+                <a:spcPct val="150000"/>
+              </a:lnSpc>
+            </a:pPr>
+            <a:r>
+              <a:rPr lang="ru-RU" sz="2400" dirty="0">
+                <a:latin typeface="JetBrains Mono" panose="020B0509020102050004" pitchFamily="49" charset="-52"/>
+              </a:rPr>
+              <a:t>Безопасная ситуация</a:t>
+            </a:r>
+          </a:p>
+        </p:txBody>
+      </p:sp>
+      <p:pic>
+        <p:nvPicPr>
+          <p:cNvPr id="4" name="Рисунок 3">
+            <a:extLst>
+              <a:ext uri="{FF2B5EF4-FFF2-40B4-BE49-F238E27FC236}">
+                <a16:creationId xmlns:a16="http://schemas.microsoft.com/office/drawing/2014/main" id="{52F0700F-C765-47EB-A58E-D27BBC1479C6}"/>
+              </a:ext>
+            </a:extLst>
+          </p:cNvPr>
+          <p:cNvPicPr>
+            <a:picLocks noChangeAspect="1"/>
+          </p:cNvPicPr>
+          <p:nvPr/>
+        </p:nvPicPr>
+        <p:blipFill>
+          <a:blip r:embed="rId3"/>
+          <a:stretch>
+            <a:fillRect/>
+          </a:stretch>
+        </p:blipFill>
+        <p:spPr>
+          <a:xfrm>
+            <a:off x="7016622" y="2454113"/>
+            <a:ext cx="4578802" cy="3721120"/>
+          </a:xfrm>
+          <a:prstGeom prst="rect">
+            <a:avLst/>
+          </a:prstGeom>
+        </p:spPr>
+      </p:pic>
+    </p:spTree>
+    <p:extLst>
+      <p:ext uri="{BB962C8B-B14F-4D97-AF65-F5344CB8AC3E}">
+        <p14:creationId xmlns:p14="http://schemas.microsoft.com/office/powerpoint/2010/main" val="2934228151"/>
+      </p:ext>
+    </p:extLst>
+  </p:cSld>
+  <p:clrMapOvr>
+    <a:masterClrMapping/>
+  </p:clrMapOvr>
+</p:sld>
+</file>
+
+<file path=ppt/slides/slide11.xml><?xml version="1.0" encoding="utf-8"?>
+<p:sld xmlns:a="http://schemas.openxmlformats.org/drawingml/2006/main" xmlns:r="http://schemas.openxmlformats.org/officeDocument/2006/relationships" xmlns:p="http://schemas.openxmlformats.org/presentationml/2006/main">
+  <p:cSld>
+    <p:spTree>
+      <p:nvGrpSpPr>
+        <p:cNvPr id="1" name=""/>
+        <p:cNvGrpSpPr/>
+        <p:nvPr/>
+      </p:nvGrpSpPr>
+      <p:grpSpPr>
+        <a:xfrm>
+          <a:off x="0" y="0"/>
+          <a:ext cx="0" cy="0"/>
+          <a:chOff x="0" y="0"/>
+          <a:chExt cx="0" cy="0"/>
+        </a:xfrm>
+      </p:grpSpPr>
+      <p:sp>
+        <p:nvSpPr>
+          <p:cNvPr id="2" name="Заголовок 1">
+            <a:extLst>
+              <a:ext uri="{FF2B5EF4-FFF2-40B4-BE49-F238E27FC236}">
+                <a16:creationId xmlns:a16="http://schemas.microsoft.com/office/drawing/2014/main" id="{4E440BA2-38E4-43E9-AC33-5E04489F6CCC}"/>
+              </a:ext>
+            </a:extLst>
+          </p:cNvPr>
+          <p:cNvSpPr>
+            <a:spLocks noGrp="1"/>
+          </p:cNvSpPr>
+          <p:nvPr>
+            <p:ph type="title"/>
+          </p:nvPr>
+        </p:nvSpPr>
+        <p:spPr>
+          <a:xfrm>
+            <a:off x="838200" y="159851"/>
+            <a:ext cx="10515600" cy="1325563"/>
+          </a:xfrm>
+        </p:spPr>
+        <p:txBody>
+          <a:bodyPr/>
+          <a:lstStyle/>
+          <a:p>
+            <a:pPr algn="ctr"/>
+            <a:r>
+              <a:rPr lang="ru-RU" dirty="0">
+                <a:latin typeface="JetBrains Mono" panose="020B0509020102050004" pitchFamily="49" charset="-52"/>
+              </a:rPr>
+              <a:t>Моделирование работы системы</a:t>
+            </a:r>
+            <a:endParaRPr lang="ru-BY" dirty="0"/>
+          </a:p>
+        </p:txBody>
+      </p:sp>
+      <p:pic>
+        <p:nvPicPr>
+          <p:cNvPr id="5" name="Объект 4">
+            <a:extLst>
+              <a:ext uri="{FF2B5EF4-FFF2-40B4-BE49-F238E27FC236}">
+                <a16:creationId xmlns:a16="http://schemas.microsoft.com/office/drawing/2014/main" id="{0959CB2D-C840-414D-A502-69E6A8C0C3FC}"/>
+              </a:ext>
+            </a:extLst>
+          </p:cNvPr>
+          <p:cNvPicPr>
+            <a:picLocks noGrp="1" noChangeAspect="1"/>
+          </p:cNvPicPr>
+          <p:nvPr>
+            <p:ph idx="1"/>
+          </p:nvPr>
+        </p:nvPicPr>
+        <p:blipFill>
+          <a:blip r:embed="rId2"/>
+          <a:stretch>
+            <a:fillRect/>
+          </a:stretch>
+        </p:blipFill>
+        <p:spPr>
+          <a:xfrm>
+            <a:off x="727144" y="2467594"/>
+            <a:ext cx="4683967" cy="3410293"/>
+          </a:xfrm>
+        </p:spPr>
+      </p:pic>
+      <p:sp>
+        <p:nvSpPr>
+          <p:cNvPr id="6" name="TextBox 5">
+            <a:extLst>
+              <a:ext uri="{FF2B5EF4-FFF2-40B4-BE49-F238E27FC236}">
+                <a16:creationId xmlns:a16="http://schemas.microsoft.com/office/drawing/2014/main" id="{3E06257F-9240-4122-8C02-3BD68CC66601}"/>
+              </a:ext>
+            </a:extLst>
+          </p:cNvPr>
+          <p:cNvSpPr txBox="1"/>
+          <p:nvPr/>
+        </p:nvSpPr>
+        <p:spPr>
+          <a:xfrm>
+            <a:off x="1573870" y="1639882"/>
+            <a:ext cx="6097554" cy="588238"/>
+          </a:xfrm>
+          <a:prstGeom prst="rect">
+            <a:avLst/>
+          </a:prstGeom>
+          <a:noFill/>
+        </p:spPr>
+        <p:txBody>
+          <a:bodyPr wrap="square">
+            <a:spAutoFit/>
+          </a:bodyPr>
+          <a:lstStyle/>
+          <a:p>
+            <a:pPr>
+              <a:lnSpc>
+                <a:spcPct val="150000"/>
+              </a:lnSpc>
+            </a:pPr>
+            <a:r>
+              <a:rPr lang="ru-RU" sz="2400" dirty="0">
+                <a:latin typeface="JetBrains Mono" panose="020B0509020102050004" pitchFamily="49" charset="-52"/>
+              </a:rPr>
+              <a:t>Опасная ситуация</a:t>
+            </a:r>
+          </a:p>
+        </p:txBody>
+      </p:sp>
+      <p:sp>
+        <p:nvSpPr>
+          <p:cNvPr id="9" name="TextBox 8">
+            <a:extLst>
+              <a:ext uri="{FF2B5EF4-FFF2-40B4-BE49-F238E27FC236}">
+                <a16:creationId xmlns:a16="http://schemas.microsoft.com/office/drawing/2014/main" id="{9AD95E8D-65FF-460F-A90D-FB70945E7921}"/>
+              </a:ext>
+            </a:extLst>
+          </p:cNvPr>
+          <p:cNvSpPr txBox="1"/>
+          <p:nvPr/>
+        </p:nvSpPr>
+        <p:spPr>
+          <a:xfrm>
+            <a:off x="7810161" y="1639882"/>
+            <a:ext cx="6097554" cy="588238"/>
+          </a:xfrm>
+          <a:prstGeom prst="rect">
+            <a:avLst/>
+          </a:prstGeom>
+          <a:noFill/>
+        </p:spPr>
+        <p:txBody>
+          <a:bodyPr wrap="square">
+            <a:spAutoFit/>
+          </a:bodyPr>
+          <a:lstStyle/>
+          <a:p>
+            <a:pPr>
+              <a:lnSpc>
+                <a:spcPct val="150000"/>
+              </a:lnSpc>
+            </a:pPr>
+            <a:r>
+              <a:rPr lang="en-US" sz="2400" dirty="0">
+                <a:latin typeface="JetBrains Mono" panose="020B0509020102050004" pitchFamily="49" charset="-52"/>
+              </a:rPr>
+              <a:t>SMS-</a:t>
+            </a:r>
+            <a:r>
+              <a:rPr lang="ru-RU" sz="2400" dirty="0">
+                <a:latin typeface="JetBrains Mono" panose="020B0509020102050004" pitchFamily="49" charset="-52"/>
+              </a:rPr>
+              <a:t>оповещение</a:t>
+            </a:r>
+          </a:p>
+        </p:txBody>
+      </p:sp>
+      <p:cxnSp>
+        <p:nvCxnSpPr>
+          <p:cNvPr id="11" name="Прямая со стрелкой 10">
+            <a:extLst>
+              <a:ext uri="{FF2B5EF4-FFF2-40B4-BE49-F238E27FC236}">
+                <a16:creationId xmlns:a16="http://schemas.microsoft.com/office/drawing/2014/main" id="{844B07CB-1016-4E59-BD4A-B22C3CDD0AB6}"/>
+              </a:ext>
+            </a:extLst>
+          </p:cNvPr>
+          <p:cNvCxnSpPr>
+            <a:cxnSpLocks/>
+          </p:cNvCxnSpPr>
+          <p:nvPr/>
+        </p:nvCxnSpPr>
+        <p:spPr>
+          <a:xfrm flipV="1">
+            <a:off x="5901444" y="4036775"/>
+            <a:ext cx="765110" cy="0"/>
+          </a:xfrm>
+          <a:prstGeom prst="straightConnector1">
+            <a:avLst/>
+          </a:prstGeom>
+          <a:ln w="31750">
+            <a:tailEnd type="triangle"/>
+          </a:ln>
+        </p:spPr>
+        <p:style>
+          <a:lnRef idx="1">
+            <a:schemeClr val="dk1"/>
+          </a:lnRef>
+          <a:fillRef idx="0">
+            <a:schemeClr val="dk1"/>
+          </a:fillRef>
+          <a:effectRef idx="0">
+            <a:schemeClr val="dk1"/>
+          </a:effectRef>
+          <a:fontRef idx="minor">
+            <a:schemeClr val="tx1"/>
+          </a:fontRef>
+        </p:style>
+      </p:cxnSp>
+      <p:pic>
+        <p:nvPicPr>
+          <p:cNvPr id="4" name="Рисунок 3">
+            <a:extLst>
+              <a:ext uri="{FF2B5EF4-FFF2-40B4-BE49-F238E27FC236}">
+                <a16:creationId xmlns:a16="http://schemas.microsoft.com/office/drawing/2014/main" id="{7EEFACAD-25EF-4956-90A3-FF75FFF491F8}"/>
+              </a:ext>
+            </a:extLst>
+          </p:cNvPr>
+          <p:cNvPicPr>
+            <a:picLocks noChangeAspect="1"/>
+          </p:cNvPicPr>
+          <p:nvPr/>
+        </p:nvPicPr>
+        <p:blipFill>
+          <a:blip r:embed="rId3"/>
+          <a:stretch>
+            <a:fillRect/>
+          </a:stretch>
+        </p:blipFill>
+        <p:spPr>
+          <a:xfrm>
+            <a:off x="7233219" y="2398226"/>
+            <a:ext cx="3946832" cy="3649677"/>
+          </a:xfrm>
+          <a:prstGeom prst="rect">
+            <a:avLst/>
+          </a:prstGeom>
+        </p:spPr>
+      </p:pic>
+    </p:spTree>
+    <p:extLst>
+      <p:ext uri="{BB962C8B-B14F-4D97-AF65-F5344CB8AC3E}">
+        <p14:creationId xmlns:p14="http://schemas.microsoft.com/office/powerpoint/2010/main" val="3667956743"/>
+      </p:ext>
+    </p:extLst>
+  </p:cSld>
+  <p:clrMapOvr>
+    <a:masterClrMapping/>
+  </p:clrMapOvr>
+</p:sld>
+</file>
+
+<file path=ppt/slides/slide12.xml><?xml version="1.0" encoding="utf-8"?>
+<p:sld xmlns:a="http://schemas.openxmlformats.org/drawingml/2006/main" xmlns:r="http://schemas.openxmlformats.org/officeDocument/2006/relationships" xmlns:p="http://schemas.openxmlformats.org/presentationml/2006/main">
+  <p:cSld>
+    <p:spTree>
+      <p:nvGrpSpPr>
+        <p:cNvPr id="1" name=""/>
+        <p:cNvGrpSpPr/>
+        <p:nvPr/>
+      </p:nvGrpSpPr>
+      <p:grpSpPr>
+        <a:xfrm>
+          <a:off x="0" y="0"/>
+          <a:ext cx="0" cy="0"/>
+          <a:chOff x="0" y="0"/>
+          <a:chExt cx="0" cy="0"/>
+        </a:xfrm>
+      </p:grpSpPr>
+      <p:sp>
+        <p:nvSpPr>
+          <p:cNvPr id="2" name="Заголовок 1">
+            <a:extLst>
+              <a:ext uri="{FF2B5EF4-FFF2-40B4-BE49-F238E27FC236}">
                 <a16:creationId xmlns:a16="http://schemas.microsoft.com/office/drawing/2014/main" id="{7CC34BCE-B805-4E5F-BDBF-6BC57D0F8729}"/>
               </a:ext>
             </a:extLst>
@@ -6958,7 +7447,7 @@
             <p:ph idx="1"/>
             <p:extLst>
               <p:ext uri="{D42A27DB-BD31-4B8C-83A1-F6EECF244321}">
-                <p14:modId xmlns:p14="http://schemas.microsoft.com/office/powerpoint/2010/main" val="3045478863"/>
+                <p14:modId xmlns:p14="http://schemas.microsoft.com/office/powerpoint/2010/main" val="1116512950"/>
               </p:ext>
             </p:extLst>
           </p:nvPr>
@@ -7011,7 +7500,7 @@
                       </a:endParaRPr>
                     </a:p>
                   </a:txBody>
-                  <a:tcPr/>
+                  <a:tcPr anchor="ctr"/>
                 </a:tc>
                 <a:tc>
                   <a:txBody>
@@ -7355,7 +7844,7 @@
 </p:sld>
 </file>
 
-<file path=ppt/slides/slide11.xml><?xml version="1.0" encoding="utf-8"?>
+<file path=ppt/slides/slide13.xml><?xml version="1.0" encoding="utf-8"?>
 <p:sld xmlns:a="http://schemas.openxmlformats.org/drawingml/2006/main" xmlns:r="http://schemas.openxmlformats.org/officeDocument/2006/relationships" xmlns:p="http://schemas.openxmlformats.org/presentationml/2006/main">
   <p:cSld>
     <p:spTree>
@@ -7445,6 +7934,720 @@
           <p:cNvPr id="2" name="Заголовок 1">
             <a:extLst>
               <a:ext uri="{FF2B5EF4-FFF2-40B4-BE49-F238E27FC236}">
+                <a16:creationId xmlns:a16="http://schemas.microsoft.com/office/drawing/2014/main" id="{680167C7-ED44-487C-A021-F3FC059A0387}"/>
+              </a:ext>
+            </a:extLst>
+          </p:cNvPr>
+          <p:cNvSpPr>
+            <a:spLocks noGrp="1"/>
+          </p:cNvSpPr>
+          <p:nvPr>
+            <p:ph type="title"/>
+          </p:nvPr>
+        </p:nvSpPr>
+        <p:spPr>
+          <a:xfrm>
+            <a:off x="838200" y="190953"/>
+            <a:ext cx="10515600" cy="1325563"/>
+          </a:xfrm>
+        </p:spPr>
+        <p:txBody>
+          <a:bodyPr/>
+          <a:lstStyle/>
+          <a:p>
+            <a:pPr algn="ctr"/>
+            <a:r>
+              <a:rPr lang="ru-RU" dirty="0">
+                <a:latin typeface="JetBrains Mono" panose="020B0509020102050004" pitchFamily="49" charset="-52"/>
+              </a:rPr>
+              <a:t>Газовый котел</a:t>
+            </a:r>
+            <a:endParaRPr lang="ru-BY" dirty="0">
+              <a:latin typeface="JetBrains Mono" panose="020B0509020102050004" pitchFamily="49" charset="-52"/>
+            </a:endParaRPr>
+          </a:p>
+        </p:txBody>
+      </p:sp>
+      <p:pic>
+        <p:nvPicPr>
+          <p:cNvPr id="4" name="Рисунок 3" descr="Принцип работы газового котла - понятно и подробно">
+            <a:extLst>
+              <a:ext uri="{FF2B5EF4-FFF2-40B4-BE49-F238E27FC236}">
+                <a16:creationId xmlns:a16="http://schemas.microsoft.com/office/drawing/2014/main" id="{CCD99384-B671-4DAF-888F-215FF0C85E5F}"/>
+              </a:ext>
+            </a:extLst>
+          </p:cNvPr>
+          <p:cNvPicPr/>
+          <p:nvPr/>
+        </p:nvPicPr>
+        <p:blipFill>
+          <a:blip r:embed="rId2">
+            <a:extLst>
+              <a:ext uri="{28A0092B-C50C-407E-A947-70E740481C1C}">
+                <a14:useLocalDpi xmlns:a14="http://schemas.microsoft.com/office/drawing/2010/main" val="0"/>
+              </a:ext>
+            </a:extLst>
+          </a:blip>
+          <a:srcRect/>
+          <a:stretch>
+            <a:fillRect/>
+          </a:stretch>
+        </p:blipFill>
+        <p:spPr bwMode="auto">
+          <a:xfrm>
+            <a:off x="578498" y="2174693"/>
+            <a:ext cx="4509796" cy="3324148"/>
+          </a:xfrm>
+          <a:prstGeom prst="rect">
+            <a:avLst/>
+          </a:prstGeom>
+          <a:noFill/>
+          <a:ln>
+            <a:noFill/>
+          </a:ln>
+        </p:spPr>
+      </p:pic>
+      <p:sp>
+        <p:nvSpPr>
+          <p:cNvPr id="5" name="TextBox 4">
+            <a:extLst>
+              <a:ext uri="{FF2B5EF4-FFF2-40B4-BE49-F238E27FC236}">
+                <a16:creationId xmlns:a16="http://schemas.microsoft.com/office/drawing/2014/main" id="{A1AC1DA6-6C5A-4964-BCA5-8C1D8908A3E3}"/>
+              </a:ext>
+            </a:extLst>
+          </p:cNvPr>
+          <p:cNvSpPr txBox="1"/>
+          <p:nvPr/>
+        </p:nvSpPr>
+        <p:spPr>
+          <a:xfrm>
+            <a:off x="5024535" y="2623368"/>
+            <a:ext cx="6588967" cy="1710789"/>
+          </a:xfrm>
+          <a:prstGeom prst="rect">
+            <a:avLst/>
+          </a:prstGeom>
+          <a:noFill/>
+        </p:spPr>
+        <p:txBody>
+          <a:bodyPr wrap="square">
+            <a:spAutoFit/>
+          </a:bodyPr>
+          <a:lstStyle/>
+          <a:p>
+            <a:pPr marL="285750" indent="-285750">
+              <a:lnSpc>
+                <a:spcPct val="150000"/>
+              </a:lnSpc>
+              <a:buFontTx/>
+              <a:buChar char="-"/>
+            </a:pPr>
+            <a:r>
+              <a:rPr lang="ru-RU" dirty="0">
+                <a:latin typeface="JetBrains Mono" panose="020B0509020102050004" pitchFamily="49" charset="-52"/>
+              </a:rPr>
+              <a:t>Низкая цена топлива</a:t>
+            </a:r>
+            <a:r>
+              <a:rPr lang="en-US" dirty="0">
+                <a:latin typeface="JetBrains Mono" panose="020B0509020102050004" pitchFamily="49" charset="-52"/>
+              </a:rPr>
+              <a:t>;</a:t>
+            </a:r>
+          </a:p>
+          <a:p>
+            <a:pPr marL="285750" indent="-285750">
+              <a:lnSpc>
+                <a:spcPct val="150000"/>
+              </a:lnSpc>
+              <a:buFontTx/>
+              <a:buChar char="-"/>
+            </a:pPr>
+            <a:r>
+              <a:rPr lang="ru-RU" dirty="0">
+                <a:latin typeface="JetBrains Mono" panose="020B0509020102050004" pitchFamily="49" charset="-52"/>
+              </a:rPr>
+              <a:t>Высокий КПД</a:t>
+            </a:r>
+            <a:r>
+              <a:rPr lang="en-US" dirty="0">
+                <a:latin typeface="JetBrains Mono" panose="020B0509020102050004" pitchFamily="49" charset="-52"/>
+              </a:rPr>
+              <a:t>;</a:t>
+            </a:r>
+          </a:p>
+          <a:p>
+            <a:pPr marL="285750" indent="-285750">
+              <a:lnSpc>
+                <a:spcPct val="150000"/>
+              </a:lnSpc>
+              <a:buFontTx/>
+              <a:buChar char="-"/>
+            </a:pPr>
+            <a:r>
+              <a:rPr lang="ru-RU" dirty="0">
+                <a:latin typeface="JetBrains Mono" panose="020B0509020102050004" pitchFamily="49" charset="-52"/>
+              </a:rPr>
+              <a:t>Занимает 40% доли</a:t>
+            </a:r>
+            <a:r>
+              <a:rPr lang="en-US" dirty="0">
+                <a:latin typeface="JetBrains Mono" panose="020B0509020102050004" pitchFamily="49" charset="-52"/>
+              </a:rPr>
+              <a:t> </a:t>
+            </a:r>
+            <a:r>
+              <a:rPr lang="ru-RU" dirty="0">
+                <a:latin typeface="JetBrains Mono" panose="020B0509020102050004" pitchFamily="49" charset="-52"/>
+              </a:rPr>
+              <a:t>рынка среди других котлов</a:t>
+            </a:r>
+            <a:r>
+              <a:rPr lang="en-US" dirty="0">
+                <a:latin typeface="JetBrains Mono" panose="020B0509020102050004" pitchFamily="49" charset="-52"/>
+              </a:rPr>
+              <a:t>;</a:t>
+            </a:r>
+          </a:p>
+          <a:p>
+            <a:pPr marL="285750" indent="-285750">
+              <a:lnSpc>
+                <a:spcPct val="150000"/>
+              </a:lnSpc>
+              <a:buFontTx/>
+              <a:buChar char="-"/>
+            </a:pPr>
+            <a:r>
+              <a:rPr lang="ru-RU" dirty="0">
+                <a:latin typeface="JetBrains Mono" panose="020B0509020102050004" pitchFamily="49" charset="-52"/>
+              </a:rPr>
+              <a:t>Спрос на них будет постоянно увеличиваться.</a:t>
+            </a:r>
+          </a:p>
+        </p:txBody>
+      </p:sp>
+    </p:spTree>
+    <p:extLst>
+      <p:ext uri="{BB962C8B-B14F-4D97-AF65-F5344CB8AC3E}">
+        <p14:creationId xmlns:p14="http://schemas.microsoft.com/office/powerpoint/2010/main" val="588679767"/>
+      </p:ext>
+    </p:extLst>
+  </p:cSld>
+  <p:clrMapOvr>
+    <a:masterClrMapping/>
+  </p:clrMapOvr>
+</p:sld>
+</file>
+
+<file path=ppt/slides/slide3.xml><?xml version="1.0" encoding="utf-8"?>
+<p:sld xmlns:a="http://schemas.openxmlformats.org/drawingml/2006/main" xmlns:r="http://schemas.openxmlformats.org/officeDocument/2006/relationships" xmlns:p="http://schemas.openxmlformats.org/presentationml/2006/main">
+  <p:cSld>
+    <p:spTree>
+      <p:nvGrpSpPr>
+        <p:cNvPr id="1" name=""/>
+        <p:cNvGrpSpPr/>
+        <p:nvPr/>
+      </p:nvGrpSpPr>
+      <p:grpSpPr>
+        <a:xfrm>
+          <a:off x="0" y="0"/>
+          <a:ext cx="0" cy="0"/>
+          <a:chOff x="0" y="0"/>
+          <a:chExt cx="0" cy="0"/>
+        </a:xfrm>
+      </p:grpSpPr>
+      <p:sp>
+        <p:nvSpPr>
+          <p:cNvPr id="2" name="Заголовок 1">
+            <a:extLst>
+              <a:ext uri="{FF2B5EF4-FFF2-40B4-BE49-F238E27FC236}">
+                <a16:creationId xmlns:a16="http://schemas.microsoft.com/office/drawing/2014/main" id="{B02F43DA-E3C1-4032-BC0F-EDBA6456F7C3}"/>
+              </a:ext>
+            </a:extLst>
+          </p:cNvPr>
+          <p:cNvSpPr>
+            <a:spLocks noGrp="1"/>
+          </p:cNvSpPr>
+          <p:nvPr>
+            <p:ph type="title"/>
+          </p:nvPr>
+        </p:nvSpPr>
+        <p:spPr>
+          <a:xfrm>
+            <a:off x="838200" y="204867"/>
+            <a:ext cx="10515600" cy="1325563"/>
+          </a:xfrm>
+        </p:spPr>
+        <p:txBody>
+          <a:bodyPr/>
+          <a:lstStyle/>
+          <a:p>
+            <a:pPr algn="ctr"/>
+            <a:r>
+              <a:rPr lang="ru-RU" dirty="0">
+                <a:latin typeface="JetBrains Mono" panose="020B0509020102050004" pitchFamily="49" charset="-52"/>
+              </a:rPr>
+              <a:t>Функционал системы</a:t>
+            </a:r>
+            <a:endParaRPr lang="ru-BY" dirty="0">
+              <a:latin typeface="JetBrains Mono" panose="020B0509020102050004" pitchFamily="49" charset="-52"/>
+            </a:endParaRPr>
+          </a:p>
+        </p:txBody>
+      </p:sp>
+      <p:sp>
+        <p:nvSpPr>
+          <p:cNvPr id="4" name="TextBox 3">
+            <a:extLst>
+              <a:ext uri="{FF2B5EF4-FFF2-40B4-BE49-F238E27FC236}">
+                <a16:creationId xmlns:a16="http://schemas.microsoft.com/office/drawing/2014/main" id="{A33B5A8F-38FD-4CBC-A395-C68168A37836}"/>
+              </a:ext>
+            </a:extLst>
+          </p:cNvPr>
+          <p:cNvSpPr txBox="1"/>
+          <p:nvPr/>
+        </p:nvSpPr>
+        <p:spPr>
+          <a:xfrm>
+            <a:off x="838200" y="1934515"/>
+            <a:ext cx="7416281" cy="4204356"/>
+          </a:xfrm>
+          <a:prstGeom prst="rect">
+            <a:avLst/>
+          </a:prstGeom>
+          <a:noFill/>
+        </p:spPr>
+        <p:txBody>
+          <a:bodyPr wrap="square">
+            <a:spAutoFit/>
+          </a:bodyPr>
+          <a:lstStyle/>
+          <a:p>
+            <a:pPr marL="285750" indent="-285750">
+              <a:lnSpc>
+                <a:spcPct val="150000"/>
+              </a:lnSpc>
+              <a:buFontTx/>
+              <a:buChar char="-"/>
+            </a:pPr>
+            <a:r>
+              <a:rPr lang="ru-RU" dirty="0">
+                <a:latin typeface="JetBrains Mono" panose="020B0509020102050004" pitchFamily="49" charset="-52"/>
+              </a:rPr>
+              <a:t>Определение превышения концентрации угарного (</a:t>
+            </a:r>
+            <a:r>
+              <a:rPr lang="en-US" dirty="0">
+                <a:latin typeface="JetBrains Mono" panose="020B0509020102050004" pitchFamily="49" charset="-52"/>
+              </a:rPr>
+              <a:t>CO</a:t>
+            </a:r>
+            <a:r>
+              <a:rPr lang="ru-RU" dirty="0">
+                <a:latin typeface="JetBrains Mono" panose="020B0509020102050004" pitchFamily="49" charset="-52"/>
+              </a:rPr>
+              <a:t>)</a:t>
+            </a:r>
+            <a:r>
+              <a:rPr lang="en-US" dirty="0">
+                <a:latin typeface="JetBrains Mono" panose="020B0509020102050004" pitchFamily="49" charset="-52"/>
+              </a:rPr>
+              <a:t>,</a:t>
+            </a:r>
+            <a:r>
+              <a:rPr lang="ru-RU" dirty="0">
+                <a:latin typeface="JetBrains Mono" panose="020B0509020102050004" pitchFamily="49" charset="-52"/>
+              </a:rPr>
+              <a:t> углекислого</a:t>
+            </a:r>
+            <a:r>
+              <a:rPr lang="en-US" dirty="0">
+                <a:latin typeface="JetBrains Mono" panose="020B0509020102050004" pitchFamily="49" charset="-52"/>
+              </a:rPr>
+              <a:t> </a:t>
+            </a:r>
+            <a:r>
+              <a:rPr lang="ru-RU" dirty="0">
+                <a:latin typeface="JetBrains Mono" panose="020B0509020102050004" pitchFamily="49" charset="-52"/>
+              </a:rPr>
+              <a:t>(</a:t>
+            </a:r>
+            <a:r>
+              <a:rPr lang="en-US" dirty="0">
+                <a:latin typeface="JetBrains Mono" panose="020B0509020102050004" pitchFamily="49" charset="-52"/>
+              </a:rPr>
+              <a:t>CO</a:t>
+            </a:r>
+            <a:r>
+              <a:rPr lang="en-US" sz="1200" dirty="0">
+                <a:latin typeface="JetBrains Mono" panose="020B0509020102050004" pitchFamily="49" charset="-52"/>
+              </a:rPr>
+              <a:t>2</a:t>
+            </a:r>
+            <a:r>
+              <a:rPr lang="ru-RU" sz="1200" dirty="0">
+                <a:latin typeface="JetBrains Mono" panose="020B0509020102050004" pitchFamily="49" charset="-52"/>
+              </a:rPr>
+              <a:t>)</a:t>
+            </a:r>
+            <a:r>
+              <a:rPr lang="en-US" sz="1200" dirty="0">
+                <a:latin typeface="JetBrains Mono" panose="020B0509020102050004" pitchFamily="49" charset="-52"/>
+              </a:rPr>
+              <a:t> </a:t>
+            </a:r>
+            <a:r>
+              <a:rPr lang="ru-RU" dirty="0">
+                <a:latin typeface="JetBrains Mono" panose="020B0509020102050004" pitchFamily="49" charset="-52"/>
+              </a:rPr>
+              <a:t>и природного газов</a:t>
+            </a:r>
+            <a:r>
+              <a:rPr lang="en-US" dirty="0">
+                <a:latin typeface="JetBrains Mono" panose="020B0509020102050004" pitchFamily="49" charset="-52"/>
+              </a:rPr>
+              <a:t>;</a:t>
+            </a:r>
+            <a:endParaRPr lang="ru-RU" dirty="0">
+              <a:latin typeface="JetBrains Mono" panose="020B0509020102050004" pitchFamily="49" charset="-52"/>
+            </a:endParaRPr>
+          </a:p>
+          <a:p>
+            <a:pPr marL="285750" indent="-285750">
+              <a:lnSpc>
+                <a:spcPct val="150000"/>
+              </a:lnSpc>
+              <a:buFontTx/>
+              <a:buChar char="-"/>
+            </a:pPr>
+            <a:r>
+              <a:rPr lang="ru-RU" dirty="0">
+                <a:latin typeface="JetBrains Mono" panose="020B0509020102050004" pitchFamily="49" charset="-52"/>
+              </a:rPr>
+              <a:t>Обнаружение задымления</a:t>
+            </a:r>
+            <a:r>
+              <a:rPr lang="en-US" dirty="0">
+                <a:latin typeface="JetBrains Mono" panose="020B0509020102050004" pitchFamily="49" charset="-52"/>
+              </a:rPr>
+              <a:t>;</a:t>
+            </a:r>
+          </a:p>
+          <a:p>
+            <a:pPr marL="285750" indent="-285750">
+              <a:lnSpc>
+                <a:spcPct val="150000"/>
+              </a:lnSpc>
+              <a:buFontTx/>
+              <a:buChar char="-"/>
+            </a:pPr>
+            <a:r>
+              <a:rPr lang="ru-RU" dirty="0">
+                <a:latin typeface="JetBrains Mono" panose="020B0509020102050004" pitchFamily="49" charset="-52"/>
+              </a:rPr>
+              <a:t>Обнаружение возгорания</a:t>
+            </a:r>
+            <a:r>
+              <a:rPr lang="en-US" dirty="0">
+                <a:latin typeface="JetBrains Mono" panose="020B0509020102050004" pitchFamily="49" charset="-52"/>
+              </a:rPr>
+              <a:t>;</a:t>
+            </a:r>
+          </a:p>
+          <a:p>
+            <a:pPr marL="285750" indent="-285750">
+              <a:lnSpc>
+                <a:spcPct val="150000"/>
+              </a:lnSpc>
+              <a:buFontTx/>
+              <a:buChar char="-"/>
+            </a:pPr>
+            <a:r>
+              <a:rPr lang="ru-RU" dirty="0">
+                <a:latin typeface="JetBrains Mono" panose="020B0509020102050004" pitchFamily="49" charset="-52"/>
+              </a:rPr>
+              <a:t>Определение превышения температуры и влажности</a:t>
+            </a:r>
+            <a:r>
+              <a:rPr lang="en-US" dirty="0">
+                <a:latin typeface="JetBrains Mono" panose="020B0509020102050004" pitchFamily="49" charset="-52"/>
+              </a:rPr>
+              <a:t>;</a:t>
+            </a:r>
+          </a:p>
+          <a:p>
+            <a:pPr marL="285750" indent="-285750">
+              <a:lnSpc>
+                <a:spcPct val="150000"/>
+              </a:lnSpc>
+              <a:buFontTx/>
+              <a:buChar char="-"/>
+            </a:pPr>
+            <a:r>
+              <a:rPr lang="en-US" dirty="0">
+                <a:latin typeface="JetBrains Mono" panose="020B0509020102050004" pitchFamily="49" charset="-52"/>
+              </a:rPr>
+              <a:t>SMS-</a:t>
+            </a:r>
+            <a:r>
+              <a:rPr lang="ru-RU" dirty="0">
+                <a:latin typeface="JetBrains Mono" panose="020B0509020102050004" pitchFamily="49" charset="-52"/>
+              </a:rPr>
+              <a:t>оповещение по номеру телефона</a:t>
+            </a:r>
+            <a:r>
+              <a:rPr lang="en-US" dirty="0">
+                <a:latin typeface="JetBrains Mono" panose="020B0509020102050004" pitchFamily="49" charset="-52"/>
+              </a:rPr>
+              <a:t>;</a:t>
+            </a:r>
+          </a:p>
+          <a:p>
+            <a:pPr marL="285750" indent="-285750">
+              <a:lnSpc>
+                <a:spcPct val="150000"/>
+              </a:lnSpc>
+              <a:buFontTx/>
+              <a:buChar char="-"/>
+            </a:pPr>
+            <a:r>
+              <a:rPr lang="ru-RU" dirty="0">
+                <a:latin typeface="JetBrains Mono" panose="020B0509020102050004" pitchFamily="49" charset="-52"/>
+              </a:rPr>
+              <a:t>Звуковая сигнализация</a:t>
+            </a:r>
+            <a:r>
+              <a:rPr lang="en-US" dirty="0">
+                <a:latin typeface="JetBrains Mono" panose="020B0509020102050004" pitchFamily="49" charset="-52"/>
+              </a:rPr>
+              <a:t>;</a:t>
+            </a:r>
+          </a:p>
+          <a:p>
+            <a:pPr marL="285750" indent="-285750">
+              <a:lnSpc>
+                <a:spcPct val="150000"/>
+              </a:lnSpc>
+              <a:buFontTx/>
+              <a:buChar char="-"/>
+            </a:pPr>
+            <a:r>
+              <a:rPr lang="ru-RU" dirty="0">
+                <a:latin typeface="JetBrains Mono" panose="020B0509020102050004" pitchFamily="49" charset="-52"/>
+              </a:rPr>
+              <a:t>Световая индикация</a:t>
+            </a:r>
+            <a:r>
+              <a:rPr lang="en-US" dirty="0">
+                <a:latin typeface="JetBrains Mono" panose="020B0509020102050004" pitchFamily="49" charset="-52"/>
+              </a:rPr>
+              <a:t>;</a:t>
+            </a:r>
+          </a:p>
+          <a:p>
+            <a:pPr marL="285750" indent="-285750">
+              <a:lnSpc>
+                <a:spcPct val="150000"/>
+              </a:lnSpc>
+              <a:buFontTx/>
+              <a:buChar char="-"/>
+            </a:pPr>
+            <a:r>
+              <a:rPr lang="ru-RU" dirty="0">
+                <a:latin typeface="JetBrains Mono" panose="020B0509020102050004" pitchFamily="49" charset="-52"/>
+              </a:rPr>
+              <a:t>Перекрытие подачи газа в газовый котел.</a:t>
+            </a:r>
+            <a:endParaRPr lang="en-US" dirty="0">
+              <a:latin typeface="JetBrains Mono" panose="020B0509020102050004" pitchFamily="49" charset="-52"/>
+            </a:endParaRPr>
+          </a:p>
+          <a:p>
+            <a:pPr marL="285750" indent="-285750">
+              <a:lnSpc>
+                <a:spcPct val="150000"/>
+              </a:lnSpc>
+              <a:buFontTx/>
+              <a:buChar char="-"/>
+            </a:pPr>
+            <a:endParaRPr lang="ru-BY" dirty="0"/>
+          </a:p>
+        </p:txBody>
+      </p:sp>
+      <p:pic>
+        <p:nvPicPr>
+          <p:cNvPr id="1026" name="Picture 2" descr="Углекислый газ, СО2, модель молекулы и химическая формула Иллюстрация  вектора - иллюстрации насчитывающей изолировано, газ: 126784904">
+            <a:extLst>
+              <a:ext uri="{FF2B5EF4-FFF2-40B4-BE49-F238E27FC236}">
+                <a16:creationId xmlns:a16="http://schemas.microsoft.com/office/drawing/2014/main" id="{FF9E0146-5C2B-4D36-90D1-ABFB945142F8}"/>
+              </a:ext>
+            </a:extLst>
+          </p:cNvPr>
+          <p:cNvPicPr>
+            <a:picLocks noChangeAspect="1" noChangeArrowheads="1"/>
+          </p:cNvPicPr>
+          <p:nvPr/>
+        </p:nvPicPr>
+        <p:blipFill rotWithShape="1">
+          <a:blip r:embed="rId2">
+            <a:extLst>
+              <a:ext uri="{28A0092B-C50C-407E-A947-70E740481C1C}">
+                <a14:useLocalDpi xmlns:a14="http://schemas.microsoft.com/office/drawing/2010/main" val="0"/>
+              </a:ext>
+            </a:extLst>
+          </a:blip>
+          <a:srcRect t="6770" r="10532" b="20051"/>
+          <a:stretch/>
+        </p:blipFill>
+        <p:spPr bwMode="auto">
+          <a:xfrm>
+            <a:off x="9798875" y="854958"/>
+            <a:ext cx="1839898" cy="2081076"/>
+          </a:xfrm>
+          <a:prstGeom prst="rect">
+            <a:avLst/>
+          </a:prstGeom>
+          <a:noFill/>
+          <a:extLst>
+            <a:ext uri="{909E8E84-426E-40DD-AFC4-6F175D3DCCD1}">
+              <a14:hiddenFill xmlns:a14="http://schemas.microsoft.com/office/drawing/2010/main">
+                <a:solidFill>
+                  <a:srgbClr val="FFFFFF"/>
+                </a:solidFill>
+              </a14:hiddenFill>
+            </a:ext>
+          </a:extLst>
+        </p:spPr>
+      </p:pic>
+      <p:pic>
+        <p:nvPicPr>
+          <p:cNvPr id="1028" name="Picture 4" descr="Влияние угарного газа на здоровье человека | АльфаЭко">
+            <a:extLst>
+              <a:ext uri="{FF2B5EF4-FFF2-40B4-BE49-F238E27FC236}">
+                <a16:creationId xmlns:a16="http://schemas.microsoft.com/office/drawing/2014/main" id="{3E72B2B1-E1EC-44E0-8F8B-AA29DADFD0BF}"/>
+              </a:ext>
+            </a:extLst>
+          </p:cNvPr>
+          <p:cNvPicPr>
+            <a:picLocks noChangeAspect="1" noChangeArrowheads="1"/>
+          </p:cNvPicPr>
+          <p:nvPr/>
+        </p:nvPicPr>
+        <p:blipFill>
+          <a:blip r:embed="rId3">
+            <a:extLst>
+              <a:ext uri="{28A0092B-C50C-407E-A947-70E740481C1C}">
+                <a14:useLocalDpi xmlns:a14="http://schemas.microsoft.com/office/drawing/2010/main" val="0"/>
+              </a:ext>
+            </a:extLst>
+          </a:blip>
+          <a:srcRect/>
+          <a:stretch>
+            <a:fillRect/>
+          </a:stretch>
+        </p:blipFill>
+        <p:spPr bwMode="auto">
+          <a:xfrm>
+            <a:off x="8403771" y="3283014"/>
+            <a:ext cx="1703873" cy="1277905"/>
+          </a:xfrm>
+          <a:prstGeom prst="rect">
+            <a:avLst/>
+          </a:prstGeom>
+          <a:noFill/>
+          <a:extLst>
+            <a:ext uri="{909E8E84-426E-40DD-AFC4-6F175D3DCCD1}">
+              <a14:hiddenFill xmlns:a14="http://schemas.microsoft.com/office/drawing/2010/main">
+                <a:solidFill>
+                  <a:srgbClr val="FFFFFF"/>
+                </a:solidFill>
+              </a14:hiddenFill>
+            </a:ext>
+          </a:extLst>
+        </p:spPr>
+      </p:pic>
+      <p:pic>
+        <p:nvPicPr>
+          <p:cNvPr id="1030" name="Picture 6" descr="Природный газ – экологичное моторное топливо">
+            <a:extLst>
+              <a:ext uri="{FF2B5EF4-FFF2-40B4-BE49-F238E27FC236}">
+                <a16:creationId xmlns:a16="http://schemas.microsoft.com/office/drawing/2014/main" id="{40E3A4B9-F767-49EF-B89E-8B2035AB3EDA}"/>
+              </a:ext>
+            </a:extLst>
+          </p:cNvPr>
+          <p:cNvPicPr>
+            <a:picLocks noChangeAspect="1" noChangeArrowheads="1"/>
+          </p:cNvPicPr>
+          <p:nvPr/>
+        </p:nvPicPr>
+        <p:blipFill>
+          <a:blip r:embed="rId4">
+            <a:extLst>
+              <a:ext uri="{28A0092B-C50C-407E-A947-70E740481C1C}">
+                <a14:useLocalDpi xmlns:a14="http://schemas.microsoft.com/office/drawing/2010/main" val="0"/>
+              </a:ext>
+            </a:extLst>
+          </a:blip>
+          <a:srcRect/>
+          <a:stretch>
+            <a:fillRect/>
+          </a:stretch>
+        </p:blipFill>
+        <p:spPr bwMode="auto">
+          <a:xfrm>
+            <a:off x="10412962" y="4730620"/>
+            <a:ext cx="1215701" cy="1326219"/>
+          </a:xfrm>
+          <a:prstGeom prst="rect">
+            <a:avLst/>
+          </a:prstGeom>
+          <a:noFill/>
+          <a:extLst>
+            <a:ext uri="{909E8E84-426E-40DD-AFC4-6F175D3DCCD1}">
+              <a14:hiddenFill xmlns:a14="http://schemas.microsoft.com/office/drawing/2010/main">
+                <a:solidFill>
+                  <a:srgbClr val="FFFFFF"/>
+                </a:solidFill>
+              </a14:hiddenFill>
+            </a:ext>
+          </a:extLst>
+        </p:spPr>
+      </p:pic>
+    </p:spTree>
+    <p:extLst>
+      <p:ext uri="{BB962C8B-B14F-4D97-AF65-F5344CB8AC3E}">
+        <p14:creationId xmlns:p14="http://schemas.microsoft.com/office/powerpoint/2010/main" val="2629714100"/>
+      </p:ext>
+    </p:extLst>
+  </p:cSld>
+  <p:clrMapOvr>
+    <a:masterClrMapping/>
+  </p:clrMapOvr>
+</p:sld>
+</file>
+
+<file path=ppt/slides/slide4.xml><?xml version="1.0" encoding="utf-8"?>
+<p:sld xmlns:a="http://schemas.openxmlformats.org/drawingml/2006/main" xmlns:r="http://schemas.openxmlformats.org/officeDocument/2006/relationships" xmlns:p="http://schemas.openxmlformats.org/presentationml/2006/main">
+  <p:cSld>
+    <p:spTree>
+      <p:nvGrpSpPr>
+        <p:cNvPr id="1" name=""/>
+        <p:cNvGrpSpPr/>
+        <p:nvPr/>
+      </p:nvGrpSpPr>
+      <p:grpSpPr>
+        <a:xfrm>
+          <a:off x="0" y="0"/>
+          <a:ext cx="0" cy="0"/>
+          <a:chOff x="0" y="0"/>
+          <a:chExt cx="0" cy="0"/>
+        </a:xfrm>
+      </p:grpSpPr>
+      <p:sp>
+        <p:nvSpPr>
+          <p:cNvPr id="2" name="Заголовок 1">
+            <a:extLst>
+              <a:ext uri="{FF2B5EF4-FFF2-40B4-BE49-F238E27FC236}">
                 <a16:creationId xmlns:a16="http://schemas.microsoft.com/office/drawing/2014/main" id="{7513C117-1844-4CF0-802E-60438211725D}"/>
               </a:ext>
             </a:extLst>
@@ -7897,7 +9100,7 @@
 </p:sld>
 </file>
 
-<file path=ppt/slides/slide3.xml><?xml version="1.0" encoding="utf-8"?>
+<file path=ppt/slides/slide5.xml><?xml version="1.0" encoding="utf-8"?>
 <p:sld xmlns:a="http://schemas.openxmlformats.org/drawingml/2006/main" xmlns:r="http://schemas.openxmlformats.org/officeDocument/2006/relationships" xmlns:p="http://schemas.openxmlformats.org/presentationml/2006/main">
   <p:cSld>
     <p:spTree>
@@ -8318,243 +9521,6 @@
 </p:sld>
 </file>
 
-<file path=ppt/slides/slide4.xml><?xml version="1.0" encoding="utf-8"?>
-<p:sld xmlns:a="http://schemas.openxmlformats.org/drawingml/2006/main" xmlns:r="http://schemas.openxmlformats.org/officeDocument/2006/relationships" xmlns:p="http://schemas.openxmlformats.org/presentationml/2006/main">
-  <p:cSld>
-    <p:spTree>
-      <p:nvGrpSpPr>
-        <p:cNvPr id="1" name=""/>
-        <p:cNvGrpSpPr/>
-        <p:nvPr/>
-      </p:nvGrpSpPr>
-      <p:grpSpPr>
-        <a:xfrm>
-          <a:off x="0" y="0"/>
-          <a:ext cx="0" cy="0"/>
-          <a:chOff x="0" y="0"/>
-          <a:chExt cx="0" cy="0"/>
-        </a:xfrm>
-      </p:grpSpPr>
-      <p:sp>
-        <p:nvSpPr>
-          <p:cNvPr id="2" name="Заголовок 1">
-            <a:extLst>
-              <a:ext uri="{FF2B5EF4-FFF2-40B4-BE49-F238E27FC236}">
-                <a16:creationId xmlns:a16="http://schemas.microsoft.com/office/drawing/2014/main" id="{8324FF89-97CC-417A-9368-6FB6C5B7D253}"/>
-              </a:ext>
-            </a:extLst>
-          </p:cNvPr>
-          <p:cNvSpPr>
-            <a:spLocks noGrp="1"/>
-          </p:cNvSpPr>
-          <p:nvPr>
-            <p:ph type="title"/>
-          </p:nvPr>
-        </p:nvSpPr>
-        <p:spPr>
-          <a:xfrm>
-            <a:off x="838199" y="29133"/>
-            <a:ext cx="10515600" cy="1325563"/>
-          </a:xfrm>
-        </p:spPr>
-        <p:txBody>
-          <a:bodyPr/>
-          <a:lstStyle/>
-          <a:p>
-            <a:pPr algn="ctr"/>
-            <a:r>
-              <a:rPr lang="en-US" dirty="0">
-                <a:latin typeface="JetBrains Mono" panose="020B0509020102050004" pitchFamily="49" charset="-52"/>
-                <a:ea typeface="Microsoft YaHei Light" panose="020B0502040204020203" pitchFamily="34" charset="-122"/>
-                <a:cs typeface="Times New Roman" panose="02020603050405020304" pitchFamily="18" charset="0"/>
-              </a:rPr>
-              <a:t>3D-</a:t>
-            </a:r>
-            <a:r>
-              <a:rPr lang="ru-RU" dirty="0">
-                <a:latin typeface="JetBrains Mono" panose="020B0509020102050004" pitchFamily="49" charset="-52"/>
-                <a:ea typeface="Microsoft YaHei Light" panose="020B0502040204020203" pitchFamily="34" charset="-122"/>
-                <a:cs typeface="Times New Roman" panose="02020603050405020304" pitchFamily="18" charset="0"/>
-              </a:rPr>
-              <a:t>модель печатной платы</a:t>
-            </a:r>
-            <a:endParaRPr lang="ru-BY" dirty="0">
-              <a:latin typeface="JetBrains Mono" panose="020B0509020102050004" pitchFamily="49" charset="-52"/>
-              <a:ea typeface="Microsoft YaHei Light" panose="020B0502040204020203" pitchFamily="34" charset="-122"/>
-              <a:cs typeface="Times New Roman" panose="02020603050405020304" pitchFamily="18" charset="0"/>
-            </a:endParaRPr>
-          </a:p>
-        </p:txBody>
-      </p:sp>
-      <p:pic>
-        <p:nvPicPr>
-          <p:cNvPr id="5" name="Рисунок 4">
-            <a:extLst>
-              <a:ext uri="{FF2B5EF4-FFF2-40B4-BE49-F238E27FC236}">
-                <a16:creationId xmlns:a16="http://schemas.microsoft.com/office/drawing/2014/main" id="{2C7C37D7-2649-4AF4-93A4-89AFF00BA1CF}"/>
-              </a:ext>
-            </a:extLst>
-          </p:cNvPr>
-          <p:cNvPicPr>
-            <a:picLocks noChangeAspect="1"/>
-          </p:cNvPicPr>
-          <p:nvPr/>
-        </p:nvPicPr>
-        <p:blipFill>
-          <a:blip r:embed="rId2"/>
-          <a:stretch>
-            <a:fillRect/>
-          </a:stretch>
-        </p:blipFill>
-        <p:spPr>
-          <a:xfrm>
-            <a:off x="3286045" y="1354696"/>
-            <a:ext cx="5619909" cy="5027333"/>
-          </a:xfrm>
-          <a:prstGeom prst="rect">
-            <a:avLst/>
-          </a:prstGeom>
-        </p:spPr>
-      </p:pic>
-    </p:spTree>
-    <p:extLst>
-      <p:ext uri="{BB962C8B-B14F-4D97-AF65-F5344CB8AC3E}">
-        <p14:creationId xmlns:p14="http://schemas.microsoft.com/office/powerpoint/2010/main" val="212956137"/>
-      </p:ext>
-    </p:extLst>
-  </p:cSld>
-  <p:clrMapOvr>
-    <a:masterClrMapping/>
-  </p:clrMapOvr>
-</p:sld>
-</file>
-
-<file path=ppt/slides/slide5.xml><?xml version="1.0" encoding="utf-8"?>
-<p:sld xmlns:a="http://schemas.openxmlformats.org/drawingml/2006/main" xmlns:r="http://schemas.openxmlformats.org/officeDocument/2006/relationships" xmlns:p="http://schemas.openxmlformats.org/presentationml/2006/main">
-  <p:cSld>
-    <p:spTree>
-      <p:nvGrpSpPr>
-        <p:cNvPr id="1" name=""/>
-        <p:cNvGrpSpPr/>
-        <p:nvPr/>
-      </p:nvGrpSpPr>
-      <p:grpSpPr>
-        <a:xfrm>
-          <a:off x="0" y="0"/>
-          <a:ext cx="0" cy="0"/>
-          <a:chOff x="0" y="0"/>
-          <a:chExt cx="0" cy="0"/>
-        </a:xfrm>
-      </p:grpSpPr>
-      <p:sp>
-        <p:nvSpPr>
-          <p:cNvPr id="2" name="Заголовок 1">
-            <a:extLst>
-              <a:ext uri="{FF2B5EF4-FFF2-40B4-BE49-F238E27FC236}">
-                <a16:creationId xmlns:a16="http://schemas.microsoft.com/office/drawing/2014/main" id="{E5DAD7F3-92FD-456B-AC14-5828B70BEB50}"/>
-              </a:ext>
-            </a:extLst>
-          </p:cNvPr>
-          <p:cNvSpPr>
-            <a:spLocks noGrp="1"/>
-          </p:cNvSpPr>
-          <p:nvPr>
-            <p:ph type="title"/>
-          </p:nvPr>
-        </p:nvSpPr>
-        <p:spPr>
-          <a:xfrm>
-            <a:off x="838200" y="264160"/>
-            <a:ext cx="10515600" cy="1325563"/>
-          </a:xfrm>
-        </p:spPr>
-        <p:txBody>
-          <a:bodyPr/>
-          <a:lstStyle/>
-          <a:p>
-            <a:pPr algn="ctr"/>
-            <a:r>
-              <a:rPr lang="en-US" dirty="0">
-                <a:latin typeface="JetBrains Mono" panose="020B0509020102050004" pitchFamily="49" charset="-52"/>
-                <a:ea typeface="Microsoft YaHei Light" panose="020B0502040204020203" pitchFamily="34" charset="-122"/>
-                <a:cs typeface="Times New Roman" panose="02020603050405020304" pitchFamily="18" charset="0"/>
-              </a:rPr>
-              <a:t>3D-</a:t>
-            </a:r>
-            <a:r>
-              <a:rPr lang="ru-RU" dirty="0">
-                <a:latin typeface="JetBrains Mono" panose="020B0509020102050004" pitchFamily="49" charset="-52"/>
-                <a:ea typeface="Microsoft YaHei Light" panose="020B0502040204020203" pitchFamily="34" charset="-122"/>
-                <a:cs typeface="Times New Roman" panose="02020603050405020304" pitchFamily="18" charset="0"/>
-              </a:rPr>
-              <a:t>модель корпуса</a:t>
-            </a:r>
-            <a:r>
-              <a:rPr lang="en-US" dirty="0">
-                <a:latin typeface="JetBrains Mono" panose="020B0509020102050004" pitchFamily="49" charset="-52"/>
-                <a:ea typeface="Microsoft YaHei Light" panose="020B0502040204020203" pitchFamily="34" charset="-122"/>
-                <a:cs typeface="Times New Roman" panose="02020603050405020304" pitchFamily="18" charset="0"/>
-              </a:rPr>
-              <a:t> </a:t>
-            </a:r>
-            <a:r>
-              <a:rPr lang="ru-RU" dirty="0">
-                <a:latin typeface="JetBrains Mono" panose="020B0509020102050004" pitchFamily="49" charset="-52"/>
-                <a:ea typeface="Microsoft YaHei Light" panose="020B0502040204020203" pitchFamily="34" charset="-122"/>
-                <a:cs typeface="Times New Roman" panose="02020603050405020304" pitchFamily="18" charset="0"/>
-              </a:rPr>
-              <a:t>устройства</a:t>
-            </a:r>
-            <a:endParaRPr lang="ru-BY" dirty="0">
-              <a:latin typeface="JetBrains Mono" panose="020B0509020102050004" pitchFamily="49" charset="-52"/>
-              <a:ea typeface="Microsoft YaHei Light" panose="020B0502040204020203" pitchFamily="34" charset="-122"/>
-              <a:cs typeface="Times New Roman" panose="02020603050405020304" pitchFamily="18" charset="0"/>
-            </a:endParaRPr>
-          </a:p>
-        </p:txBody>
-      </p:sp>
-      <p:pic>
-        <p:nvPicPr>
-          <p:cNvPr id="9" name="Объект 8">
-            <a:extLst>
-              <a:ext uri="{FF2B5EF4-FFF2-40B4-BE49-F238E27FC236}">
-                <a16:creationId xmlns:a16="http://schemas.microsoft.com/office/drawing/2014/main" id="{B06C7129-61BD-42F7-BEC1-BD38DA441B7E}"/>
-              </a:ext>
-            </a:extLst>
-          </p:cNvPr>
-          <p:cNvPicPr>
-            <a:picLocks noGrp="1" noChangeAspect="1"/>
-          </p:cNvPicPr>
-          <p:nvPr>
-            <p:ph idx="1"/>
-          </p:nvPr>
-        </p:nvPicPr>
-        <p:blipFill>
-          <a:blip r:embed="rId2"/>
-          <a:stretch>
-            <a:fillRect/>
-          </a:stretch>
-        </p:blipFill>
-        <p:spPr>
-          <a:xfrm>
-            <a:off x="1100860" y="1549341"/>
-            <a:ext cx="9990280" cy="5044499"/>
-          </a:xfrm>
-        </p:spPr>
-      </p:pic>
-    </p:spTree>
-    <p:extLst>
-      <p:ext uri="{BB962C8B-B14F-4D97-AF65-F5344CB8AC3E}">
-        <p14:creationId xmlns:p14="http://schemas.microsoft.com/office/powerpoint/2010/main" val="354905101"/>
-      </p:ext>
-    </p:extLst>
-  </p:cSld>
-  <p:clrMapOvr>
-    <a:masterClrMapping/>
-  </p:clrMapOvr>
-</p:sld>
-</file>
-
 <file path=ppt/slides/slide6.xml><?xml version="1.0" encoding="utf-8"?>
 <p:sld xmlns:a="http://schemas.openxmlformats.org/drawingml/2006/main" xmlns:r="http://schemas.openxmlformats.org/officeDocument/2006/relationships" xmlns:p="http://schemas.openxmlformats.org/presentationml/2006/main">
   <p:cSld>
@@ -8577,7 +9543,7 @@
           <p:cNvPr id="2" name="Заголовок 1">
             <a:extLst>
               <a:ext uri="{FF2B5EF4-FFF2-40B4-BE49-F238E27FC236}">
-                <a16:creationId xmlns:a16="http://schemas.microsoft.com/office/drawing/2014/main" id="{65530EF6-360F-44C0-9875-0B4CE17749C9}"/>
+                <a16:creationId xmlns:a16="http://schemas.microsoft.com/office/drawing/2014/main" id="{8324FF89-97CC-417A-9368-6FB6C5B7D253}"/>
               </a:ext>
             </a:extLst>
           </p:cNvPr>
@@ -8588,87 +9554,239 @@
             <p:ph type="title"/>
           </p:nvPr>
         </p:nvSpPr>
-        <p:spPr/>
+        <p:spPr>
+          <a:xfrm>
+            <a:off x="838199" y="-70072"/>
+            <a:ext cx="10515600" cy="1325563"/>
+          </a:xfrm>
+        </p:spPr>
         <p:txBody>
           <a:bodyPr/>
           <a:lstStyle/>
           <a:p>
             <a:pPr algn="ctr"/>
             <a:r>
+              <a:rPr lang="en-US" dirty="0">
+                <a:latin typeface="JetBrains Mono" panose="020B0509020102050004" pitchFamily="49" charset="-52"/>
+                <a:ea typeface="Microsoft YaHei Light" panose="020B0502040204020203" pitchFamily="34" charset="-122"/>
+                <a:cs typeface="Times New Roman" panose="02020603050405020304" pitchFamily="18" charset="0"/>
+              </a:rPr>
+              <a:t>3D-</a:t>
+            </a:r>
+            <a:r>
               <a:rPr lang="ru-RU" dirty="0">
                 <a:latin typeface="JetBrains Mono" panose="020B0509020102050004" pitchFamily="49" charset="-52"/>
-              </a:rPr>
-              <a:t>Потребляемые ресурсы</a:t>
+                <a:ea typeface="Microsoft YaHei Light" panose="020B0502040204020203" pitchFamily="34" charset="-122"/>
+                <a:cs typeface="Times New Roman" panose="02020603050405020304" pitchFamily="18" charset="0"/>
+              </a:rPr>
+              <a:t>модель печатной платы</a:t>
             </a:r>
             <a:endParaRPr lang="ru-BY" dirty="0">
               <a:latin typeface="JetBrains Mono" panose="020B0509020102050004" pitchFamily="49" charset="-52"/>
+              <a:ea typeface="Microsoft YaHei Light" panose="020B0502040204020203" pitchFamily="34" charset="-122"/>
+              <a:cs typeface="Times New Roman" panose="02020603050405020304" pitchFamily="18" charset="0"/>
             </a:endParaRPr>
           </a:p>
         </p:txBody>
       </p:sp>
-      <p:graphicFrame>
-        <p:nvGraphicFramePr>
-          <p:cNvPr id="9" name="Диаграмма 8">
-            <a:extLst>
-              <a:ext uri="{FF2B5EF4-FFF2-40B4-BE49-F238E27FC236}">
-                <a16:creationId xmlns:a16="http://schemas.microsoft.com/office/drawing/2014/main" id="{EE90883D-F0EF-4D28-B863-A99D26AF952B}"/>
-              </a:ext>
-            </a:extLst>
-          </p:cNvPr>
-          <p:cNvGraphicFramePr/>
-          <p:nvPr>
-            <p:extLst>
-              <p:ext uri="{D42A27DB-BD31-4B8C-83A1-F6EECF244321}">
-                <p14:modId xmlns:p14="http://schemas.microsoft.com/office/powerpoint/2010/main" val="1634206938"/>
-              </p:ext>
-            </p:extLst>
-          </p:nvPr>
-        </p:nvGraphicFramePr>
-        <p:xfrm>
-          <a:off x="6096000" y="1980077"/>
-          <a:ext cx="5330756" cy="4351338"/>
-        </p:xfrm>
-        <a:graphic>
-          <a:graphicData uri="http://schemas.openxmlformats.org/drawingml/2006/chart">
-            <c:chart xmlns:c="http://schemas.openxmlformats.org/drawingml/2006/chart" xmlns:r="http://schemas.openxmlformats.org/officeDocument/2006/relationships" r:id="rId2"/>
-          </a:graphicData>
-        </a:graphic>
-      </p:graphicFrame>
-      <p:graphicFrame>
-        <p:nvGraphicFramePr>
-          <p:cNvPr id="14" name="Объект 13">
-            <a:extLst>
-              <a:ext uri="{FF2B5EF4-FFF2-40B4-BE49-F238E27FC236}">
-                <a16:creationId xmlns:a16="http://schemas.microsoft.com/office/drawing/2014/main" id="{872B1956-6336-43E0-B89D-E409070F81D3}"/>
-              </a:ext>
-            </a:extLst>
-          </p:cNvPr>
-          <p:cNvGraphicFramePr>
-            <a:graphicFrameLocks noGrp="1"/>
-          </p:cNvGraphicFramePr>
-          <p:nvPr>
-            <p:ph idx="1"/>
-            <p:extLst>
-              <p:ext uri="{D42A27DB-BD31-4B8C-83A1-F6EECF244321}">
-                <p14:modId xmlns:p14="http://schemas.microsoft.com/office/powerpoint/2010/main" val="2848107797"/>
-              </p:ext>
-            </p:extLst>
-          </p:nvPr>
-        </p:nvGraphicFramePr>
-        <p:xfrm>
-          <a:off x="437747" y="1980077"/>
-          <a:ext cx="5891719" cy="4351338"/>
-        </p:xfrm>
-        <a:graphic>
-          <a:graphicData uri="http://schemas.openxmlformats.org/drawingml/2006/chart">
-            <c:chart xmlns:c="http://schemas.openxmlformats.org/drawingml/2006/chart" xmlns:r="http://schemas.openxmlformats.org/officeDocument/2006/relationships" r:id="rId3"/>
-          </a:graphicData>
-        </a:graphic>
-      </p:graphicFrame>
+      <p:pic>
+        <p:nvPicPr>
+          <p:cNvPr id="5" name="Рисунок 4">
+            <a:extLst>
+              <a:ext uri="{FF2B5EF4-FFF2-40B4-BE49-F238E27FC236}">
+                <a16:creationId xmlns:a16="http://schemas.microsoft.com/office/drawing/2014/main" id="{2C7C37D7-2649-4AF4-93A4-89AFF00BA1CF}"/>
+              </a:ext>
+            </a:extLst>
+          </p:cNvPr>
+          <p:cNvPicPr>
+            <a:picLocks noChangeAspect="1"/>
+          </p:cNvPicPr>
+          <p:nvPr/>
+        </p:nvPicPr>
+        <p:blipFill>
+          <a:blip r:embed="rId2"/>
+          <a:stretch>
+            <a:fillRect/>
+          </a:stretch>
+        </p:blipFill>
+        <p:spPr>
+          <a:xfrm>
+            <a:off x="838199" y="1354696"/>
+            <a:ext cx="5619909" cy="5027333"/>
+          </a:xfrm>
+          <a:prstGeom prst="rect">
+            <a:avLst/>
+          </a:prstGeom>
+        </p:spPr>
+      </p:pic>
+      <p:sp>
+        <p:nvSpPr>
+          <p:cNvPr id="4" name="TextBox 3">
+            <a:extLst>
+              <a:ext uri="{FF2B5EF4-FFF2-40B4-BE49-F238E27FC236}">
+                <a16:creationId xmlns:a16="http://schemas.microsoft.com/office/drawing/2014/main" id="{D455D5CB-BBA6-4863-8F4C-4C45CA31D8E4}"/>
+              </a:ext>
+            </a:extLst>
+          </p:cNvPr>
+          <p:cNvSpPr txBox="1"/>
+          <p:nvPr/>
+        </p:nvSpPr>
+        <p:spPr>
+          <a:xfrm>
+            <a:off x="7048500" y="2663275"/>
+            <a:ext cx="6421016" cy="1710789"/>
+          </a:xfrm>
+          <a:prstGeom prst="rect">
+            <a:avLst/>
+          </a:prstGeom>
+          <a:noFill/>
+        </p:spPr>
+        <p:txBody>
+          <a:bodyPr wrap="square">
+            <a:spAutoFit/>
+          </a:bodyPr>
+          <a:lstStyle/>
+          <a:p>
+            <a:pPr marL="285750" indent="-285750">
+              <a:lnSpc>
+                <a:spcPct val="150000"/>
+              </a:lnSpc>
+              <a:buFontTx/>
+              <a:buChar char="-"/>
+            </a:pPr>
+            <a:r>
+              <a:rPr lang="ru-RU" dirty="0">
+                <a:latin typeface="JetBrains Mono" panose="020B0509020102050004" pitchFamily="49" charset="-52"/>
+              </a:rPr>
+              <a:t>3-й класс точности</a:t>
+            </a:r>
+            <a:r>
+              <a:rPr lang="en-US" dirty="0">
+                <a:latin typeface="JetBrains Mono" panose="020B0509020102050004" pitchFamily="49" charset="-52"/>
+              </a:rPr>
+              <a:t>;</a:t>
+            </a:r>
+          </a:p>
+          <a:p>
+            <a:pPr marL="285750" indent="-285750">
+              <a:lnSpc>
+                <a:spcPct val="150000"/>
+              </a:lnSpc>
+              <a:buFontTx/>
+              <a:buChar char="-"/>
+            </a:pPr>
+            <a:r>
+              <a:rPr lang="ru-RU" dirty="0">
+                <a:latin typeface="JetBrains Mono" panose="020B0509020102050004" pitchFamily="49" charset="-52"/>
+              </a:rPr>
+              <a:t>Паяльная паста </a:t>
+            </a:r>
+            <a:r>
+              <a:rPr lang="en-US" dirty="0">
+                <a:latin typeface="JetBrains Mono" panose="020B0509020102050004" pitchFamily="49" charset="-52"/>
+              </a:rPr>
+              <a:t>Mechanic XG-50;</a:t>
+            </a:r>
+          </a:p>
+          <a:p>
+            <a:pPr marL="285750" indent="-285750">
+              <a:lnSpc>
+                <a:spcPct val="150000"/>
+              </a:lnSpc>
+              <a:buFontTx/>
+              <a:buChar char="-"/>
+            </a:pPr>
+            <a:r>
+              <a:rPr lang="ru-RU" dirty="0" err="1">
+                <a:latin typeface="JetBrains Mono" panose="020B0509020102050004" pitchFamily="49" charset="-52"/>
+              </a:rPr>
+              <a:t>Бессвинцовый</a:t>
+            </a:r>
+            <a:r>
+              <a:rPr lang="ru-RU" dirty="0">
+                <a:latin typeface="JetBrains Mono" panose="020B0509020102050004" pitchFamily="49" charset="-52"/>
+              </a:rPr>
+              <a:t> припой ПОМ-3</a:t>
+            </a:r>
+            <a:r>
+              <a:rPr lang="en-US" dirty="0">
+                <a:latin typeface="JetBrains Mono" panose="020B0509020102050004" pitchFamily="49" charset="-52"/>
+              </a:rPr>
+              <a:t>;</a:t>
+            </a:r>
+          </a:p>
+          <a:p>
+            <a:pPr marL="285750" indent="-285750">
+              <a:lnSpc>
+                <a:spcPct val="150000"/>
+              </a:lnSpc>
+              <a:buFontTx/>
+              <a:buChar char="-"/>
+            </a:pPr>
+            <a:r>
+              <a:rPr lang="ru-RU" dirty="0">
+                <a:latin typeface="JetBrains Mono" panose="020B0509020102050004" pitchFamily="49" charset="-52"/>
+              </a:rPr>
+              <a:t>Покрытие лаком </a:t>
+            </a:r>
+            <a:r>
+              <a:rPr lang="en-US" dirty="0">
+                <a:latin typeface="JetBrains Mono" panose="020B0509020102050004" pitchFamily="49" charset="-52"/>
+              </a:rPr>
+              <a:t>PLASTIK 71.</a:t>
+            </a:r>
+            <a:endParaRPr lang="ru-RU" dirty="0">
+              <a:latin typeface="JetBrains Mono" panose="020B0509020102050004" pitchFamily="49" charset="-52"/>
+            </a:endParaRPr>
+          </a:p>
+        </p:txBody>
+      </p:sp>
+      <p:sp>
+        <p:nvSpPr>
+          <p:cNvPr id="6" name="TextBox 5">
+            <a:extLst>
+              <a:ext uri="{FF2B5EF4-FFF2-40B4-BE49-F238E27FC236}">
+                <a16:creationId xmlns:a16="http://schemas.microsoft.com/office/drawing/2014/main" id="{90DE48E4-AC4B-4B4C-BADC-0A475614AA63}"/>
+              </a:ext>
+            </a:extLst>
+          </p:cNvPr>
+          <p:cNvSpPr txBox="1"/>
+          <p:nvPr/>
+        </p:nvSpPr>
+        <p:spPr>
+          <a:xfrm>
+            <a:off x="7048500" y="5781848"/>
+            <a:ext cx="6097554" cy="464294"/>
+          </a:xfrm>
+          <a:prstGeom prst="rect">
+            <a:avLst/>
+          </a:prstGeom>
+          <a:noFill/>
+        </p:spPr>
+        <p:txBody>
+          <a:bodyPr wrap="square">
+            <a:spAutoFit/>
+          </a:bodyPr>
+          <a:lstStyle/>
+          <a:p>
+            <a:pPr>
+              <a:lnSpc>
+                <a:spcPct val="150000"/>
+              </a:lnSpc>
+            </a:pPr>
+            <a:r>
+              <a:rPr lang="ru-RU" dirty="0">
+                <a:latin typeface="JetBrains Mono" panose="020B0509020102050004" pitchFamily="49" charset="-52"/>
+              </a:rPr>
+              <a:t>Размеры платы: 110 х 180 х 1,5 мм</a:t>
+            </a:r>
+          </a:p>
+        </p:txBody>
+      </p:sp>
     </p:spTree>
     <p:extLst>
       <p:ext uri="{BB962C8B-B14F-4D97-AF65-F5344CB8AC3E}">
-        <p14:creationId xmlns:p14="http://schemas.microsoft.com/office/powerpoint/2010/main" val="1581041747"/>
+        <p14:creationId xmlns:p14="http://schemas.microsoft.com/office/powerpoint/2010/main" val="212956137"/>
       </p:ext>
     </p:extLst>
   </p:cSld>
@@ -8700,7 +9818,7 @@
           <p:cNvPr id="2" name="Заголовок 1">
             <a:extLst>
               <a:ext uri="{FF2B5EF4-FFF2-40B4-BE49-F238E27FC236}">
-                <a16:creationId xmlns:a16="http://schemas.microsoft.com/office/drawing/2014/main" id="{EAA94A8A-7EF0-46FE-9CC4-47849B8225F6}"/>
+                <a16:creationId xmlns:a16="http://schemas.microsoft.com/office/drawing/2014/main" id="{E5DAD7F3-92FD-456B-AC14-5828B70BEB50}"/>
               </a:ext>
             </a:extLst>
           </p:cNvPr>
@@ -8713,7 +9831,7 @@
         </p:nvSpPr>
         <p:spPr>
           <a:xfrm>
-            <a:off x="838200" y="150521"/>
+            <a:off x="838199" y="108650"/>
             <a:ext cx="10515600" cy="1325563"/>
           </a:xfrm>
         </p:spPr>
@@ -8723,26 +9841,56 @@
           <a:p>
             <a:pPr algn="ctr"/>
             <a:r>
+              <a:rPr lang="en-US" dirty="0">
+                <a:latin typeface="JetBrains Mono" panose="020B0509020102050004" pitchFamily="49" charset="-52"/>
+                <a:ea typeface="Microsoft YaHei Light" panose="020B0502040204020203" pitchFamily="34" charset="-122"/>
+                <a:cs typeface="Times New Roman" panose="02020603050405020304" pitchFamily="18" charset="0"/>
+              </a:rPr>
+              <a:t>3D-</a:t>
+            </a:r>
+            <a:r>
               <a:rPr lang="ru-RU" dirty="0">
                 <a:latin typeface="JetBrains Mono" panose="020B0509020102050004" pitchFamily="49" charset="-52"/>
-              </a:rPr>
-              <a:t>Моделирование работы системы</a:t>
-            </a:r>
-            <a:endParaRPr lang="ru-BY" dirty="0"/>
+                <a:ea typeface="Microsoft YaHei Light" panose="020B0502040204020203" pitchFamily="34" charset="-122"/>
+                <a:cs typeface="Times New Roman" panose="02020603050405020304" pitchFamily="18" charset="0"/>
+              </a:rPr>
+              <a:t>модель корпуса</a:t>
+            </a:r>
+            <a:r>
+              <a:rPr lang="en-US" dirty="0">
+                <a:latin typeface="JetBrains Mono" panose="020B0509020102050004" pitchFamily="49" charset="-52"/>
+                <a:ea typeface="Microsoft YaHei Light" panose="020B0502040204020203" pitchFamily="34" charset="-122"/>
+                <a:cs typeface="Times New Roman" panose="02020603050405020304" pitchFamily="18" charset="0"/>
+              </a:rPr>
+              <a:t> </a:t>
+            </a:r>
+            <a:r>
+              <a:rPr lang="ru-RU" dirty="0">
+                <a:latin typeface="JetBrains Mono" panose="020B0509020102050004" pitchFamily="49" charset="-52"/>
+                <a:ea typeface="Microsoft YaHei Light" panose="020B0502040204020203" pitchFamily="34" charset="-122"/>
+                <a:cs typeface="Times New Roman" panose="02020603050405020304" pitchFamily="18" charset="0"/>
+              </a:rPr>
+              <a:t>устройства</a:t>
+            </a:r>
+            <a:endParaRPr lang="ru-BY" dirty="0">
+              <a:latin typeface="JetBrains Mono" panose="020B0509020102050004" pitchFamily="49" charset="-52"/>
+              <a:ea typeface="Microsoft YaHei Light" panose="020B0502040204020203" pitchFamily="34" charset="-122"/>
+              <a:cs typeface="Times New Roman" panose="02020603050405020304" pitchFamily="18" charset="0"/>
+            </a:endParaRPr>
           </a:p>
         </p:txBody>
       </p:sp>
       <p:pic>
         <p:nvPicPr>
-          <p:cNvPr id="4" name="Объект 3">
-            <a:extLst>
-              <a:ext uri="{FF2B5EF4-FFF2-40B4-BE49-F238E27FC236}">
-                <a16:creationId xmlns:a16="http://schemas.microsoft.com/office/drawing/2014/main" id="{E9F8FA9B-CEE9-40B5-8DEA-4A490686C8C9}"/>
+          <p:cNvPr id="9" name="Объект 8">
+            <a:extLst>
+              <a:ext uri="{FF2B5EF4-FFF2-40B4-BE49-F238E27FC236}">
+                <a16:creationId xmlns:a16="http://schemas.microsoft.com/office/drawing/2014/main" id="{B06C7129-61BD-42F7-BEC1-BD38DA441B7E}"/>
               </a:ext>
             </a:extLst>
           </p:cNvPr>
           <p:cNvPicPr>
-            <a:picLocks noGrp="1"/>
+            <a:picLocks noGrp="1" noChangeAspect="1"/>
           </p:cNvPicPr>
           <p:nvPr>
             <p:ph idx="1"/>
@@ -8756,18 +9904,147 @@
         </p:blipFill>
         <p:spPr>
           <a:xfrm>
-            <a:off x="1955682" y="1629681"/>
-            <a:ext cx="8280636" cy="4705804"/>
+            <a:off x="1744736" y="1303246"/>
+            <a:ext cx="8702525" cy="4394259"/>
+          </a:xfrm>
+        </p:spPr>
+      </p:pic>
+      <p:cxnSp>
+        <p:nvCxnSpPr>
+          <p:cNvPr id="4" name="Прямая со стрелкой 3">
+            <a:extLst>
+              <a:ext uri="{FF2B5EF4-FFF2-40B4-BE49-F238E27FC236}">
+                <a16:creationId xmlns:a16="http://schemas.microsoft.com/office/drawing/2014/main" id="{49754F9D-FEE8-488F-B38C-4DEC8685BFCD}"/>
+              </a:ext>
+            </a:extLst>
+          </p:cNvPr>
+          <p:cNvCxnSpPr>
+            <a:cxnSpLocks/>
+          </p:cNvCxnSpPr>
+          <p:nvPr/>
+        </p:nvCxnSpPr>
+        <p:spPr>
+          <a:xfrm flipH="1">
+            <a:off x="3971924" y="4340193"/>
+            <a:ext cx="885825" cy="652462"/>
+          </a:xfrm>
+          <a:prstGeom prst="straightConnector1">
+            <a:avLst/>
+          </a:prstGeom>
+          <a:ln>
+            <a:headEnd type="oval"/>
+            <a:tailEnd type="none"/>
+          </a:ln>
+        </p:spPr>
+        <p:style>
+          <a:lnRef idx="1">
+            <a:schemeClr val="accent1"/>
+          </a:lnRef>
+          <a:fillRef idx="0">
+            <a:schemeClr val="accent1"/>
+          </a:fillRef>
+          <a:effectRef idx="0">
+            <a:schemeClr val="accent1"/>
+          </a:effectRef>
+          <a:fontRef idx="minor">
+            <a:schemeClr val="tx1"/>
+          </a:fontRef>
+        </p:style>
+      </p:cxnSp>
+      <p:sp>
+        <p:nvSpPr>
+          <p:cNvPr id="7" name="TextBox 6">
+            <a:extLst>
+              <a:ext uri="{FF2B5EF4-FFF2-40B4-BE49-F238E27FC236}">
+                <a16:creationId xmlns:a16="http://schemas.microsoft.com/office/drawing/2014/main" id="{91D107E0-858F-4090-A440-21A777E263E3}"/>
+              </a:ext>
+            </a:extLst>
+          </p:cNvPr>
+          <p:cNvSpPr txBox="1"/>
+          <p:nvPr/>
+        </p:nvSpPr>
+        <p:spPr>
+          <a:xfrm>
+            <a:off x="3175809" y="4879511"/>
+            <a:ext cx="1729565" cy="422936"/>
           </a:xfrm>
           <a:prstGeom prst="rect">
             <a:avLst/>
           </a:prstGeom>
+          <a:noFill/>
         </p:spPr>
-      </p:pic>
+        <p:txBody>
+          <a:bodyPr wrap="square">
+            <a:spAutoFit/>
+          </a:bodyPr>
+          <a:lstStyle/>
+          <a:p>
+            <a:pPr>
+              <a:lnSpc>
+                <a:spcPct val="150000"/>
+              </a:lnSpc>
+            </a:pPr>
+            <a:r>
+              <a:rPr lang="en-US" sz="1600" dirty="0">
+                <a:latin typeface="JetBrains Mono" panose="020B0509020102050004" pitchFamily="49" charset="-52"/>
+              </a:rPr>
+              <a:t>ABS-</a:t>
+            </a:r>
+            <a:r>
+              <a:rPr lang="ru-RU" sz="1600" dirty="0">
+                <a:latin typeface="JetBrains Mono" panose="020B0509020102050004" pitchFamily="49" charset="-52"/>
+              </a:rPr>
+              <a:t>пластик</a:t>
+            </a:r>
+          </a:p>
+        </p:txBody>
+      </p:sp>
+      <p:sp>
+        <p:nvSpPr>
+          <p:cNvPr id="8" name="TextBox 7">
+            <a:extLst>
+              <a:ext uri="{FF2B5EF4-FFF2-40B4-BE49-F238E27FC236}">
+                <a16:creationId xmlns:a16="http://schemas.microsoft.com/office/drawing/2014/main" id="{58F94E05-51EA-48C8-9367-1593D45459C5}"/>
+              </a:ext>
+            </a:extLst>
+          </p:cNvPr>
+          <p:cNvSpPr txBox="1"/>
+          <p:nvPr/>
+        </p:nvSpPr>
+        <p:spPr>
+          <a:xfrm>
+            <a:off x="923147" y="5841765"/>
+            <a:ext cx="6097554" cy="505588"/>
+          </a:xfrm>
+          <a:prstGeom prst="rect">
+            <a:avLst/>
+          </a:prstGeom>
+          <a:noFill/>
+        </p:spPr>
+        <p:txBody>
+          <a:bodyPr wrap="square">
+            <a:spAutoFit/>
+          </a:bodyPr>
+          <a:lstStyle/>
+          <a:p>
+            <a:pPr>
+              <a:lnSpc>
+                <a:spcPct val="150000"/>
+              </a:lnSpc>
+            </a:pPr>
+            <a:r>
+              <a:rPr lang="ru-RU" sz="2000" dirty="0">
+                <a:latin typeface="JetBrains Mono" panose="020B0509020102050004" pitchFamily="49" charset="-52"/>
+              </a:rPr>
+              <a:t>Размеры корпуса: 130 х 200 х 29 мм</a:t>
+            </a:r>
+          </a:p>
+        </p:txBody>
+      </p:sp>
     </p:spTree>
     <p:extLst>
       <p:ext uri="{BB962C8B-B14F-4D97-AF65-F5344CB8AC3E}">
-        <p14:creationId xmlns:p14="http://schemas.microsoft.com/office/powerpoint/2010/main" val="219489359"/>
+        <p14:creationId xmlns:p14="http://schemas.microsoft.com/office/powerpoint/2010/main" val="354905101"/>
       </p:ext>
     </p:extLst>
   </p:cSld>
@@ -8794,192 +10071,129 @@
           <a:chExt cx="0" cy="0"/>
         </a:xfrm>
       </p:grpSpPr>
+      <p:graphicFrame>
+        <p:nvGraphicFramePr>
+          <p:cNvPr id="9" name="Диаграмма 8">
+            <a:extLst>
+              <a:ext uri="{FF2B5EF4-FFF2-40B4-BE49-F238E27FC236}">
+                <a16:creationId xmlns:a16="http://schemas.microsoft.com/office/drawing/2014/main" id="{EE90883D-F0EF-4D28-B863-A99D26AF952B}"/>
+              </a:ext>
+            </a:extLst>
+          </p:cNvPr>
+          <p:cNvGraphicFramePr/>
+          <p:nvPr>
+            <p:extLst>
+              <p:ext uri="{D42A27DB-BD31-4B8C-83A1-F6EECF244321}">
+                <p14:modId xmlns:p14="http://schemas.microsoft.com/office/powerpoint/2010/main" val="3336837310"/>
+              </p:ext>
+            </p:extLst>
+          </p:nvPr>
+        </p:nvGraphicFramePr>
+        <p:xfrm>
+          <a:off x="6096000" y="1831487"/>
+          <a:ext cx="5330756" cy="4351338"/>
+        </p:xfrm>
+        <a:graphic>
+          <a:graphicData uri="http://schemas.openxmlformats.org/drawingml/2006/chart">
+            <c:chart xmlns:c="http://schemas.openxmlformats.org/drawingml/2006/chart" xmlns:r="http://schemas.openxmlformats.org/officeDocument/2006/relationships" r:id="rId2"/>
+          </a:graphicData>
+        </a:graphic>
+      </p:graphicFrame>
+      <p:graphicFrame>
+        <p:nvGraphicFramePr>
+          <p:cNvPr id="14" name="Объект 13">
+            <a:extLst>
+              <a:ext uri="{FF2B5EF4-FFF2-40B4-BE49-F238E27FC236}">
+                <a16:creationId xmlns:a16="http://schemas.microsoft.com/office/drawing/2014/main" id="{872B1956-6336-43E0-B89D-E409070F81D3}"/>
+              </a:ext>
+            </a:extLst>
+          </p:cNvPr>
+          <p:cNvGraphicFramePr>
+            <a:graphicFrameLocks noGrp="1"/>
+          </p:cNvGraphicFramePr>
+          <p:nvPr>
+            <p:ph idx="1"/>
+            <p:extLst>
+              <p:ext uri="{D42A27DB-BD31-4B8C-83A1-F6EECF244321}">
+                <p14:modId xmlns:p14="http://schemas.microsoft.com/office/powerpoint/2010/main" val="2233350544"/>
+              </p:ext>
+            </p:extLst>
+          </p:nvPr>
+        </p:nvGraphicFramePr>
+        <p:xfrm>
+          <a:off x="437747" y="1831487"/>
+          <a:ext cx="5891719" cy="4351338"/>
+        </p:xfrm>
+        <a:graphic>
+          <a:graphicData uri="http://schemas.openxmlformats.org/drawingml/2006/chart">
+            <c:chart xmlns:c="http://schemas.openxmlformats.org/drawingml/2006/chart" xmlns:r="http://schemas.openxmlformats.org/officeDocument/2006/relationships" r:id="rId3"/>
+          </a:graphicData>
+        </a:graphic>
+      </p:graphicFrame>
       <p:sp>
         <p:nvSpPr>
-          <p:cNvPr id="2" name="Заголовок 1">
-            <a:extLst>
-              <a:ext uri="{FF2B5EF4-FFF2-40B4-BE49-F238E27FC236}">
-                <a16:creationId xmlns:a16="http://schemas.microsoft.com/office/drawing/2014/main" id="{87F6B156-2943-46BF-B7D0-570620BB150D}"/>
-              </a:ext>
-            </a:extLst>
-          </p:cNvPr>
-          <p:cNvSpPr>
-            <a:spLocks noGrp="1"/>
+          <p:cNvPr id="5" name="Заголовок 1">
+            <a:extLst>
+              <a:ext uri="{FF2B5EF4-FFF2-40B4-BE49-F238E27FC236}">
+                <a16:creationId xmlns:a16="http://schemas.microsoft.com/office/drawing/2014/main" id="{A7D912A3-0716-4547-A690-F11D21C457DA}"/>
+              </a:ext>
+            </a:extLst>
+          </p:cNvPr>
+          <p:cNvSpPr txBox="1">
+            <a:spLocks/>
           </p:cNvSpPr>
-          <p:nvPr>
-            <p:ph type="title"/>
-          </p:nvPr>
+          <p:nvPr/>
         </p:nvSpPr>
         <p:spPr>
           <a:xfrm>
-            <a:off x="838200" y="113198"/>
+            <a:off x="1071666" y="194310"/>
             <a:ext cx="10515600" cy="1325563"/>
-          </a:xfrm>
-        </p:spPr>
-        <p:txBody>
-          <a:bodyPr/>
-          <a:lstStyle/>
-          <a:p>
-            <a:pPr algn="ctr"/>
-            <a:r>
-              <a:rPr lang="ru-RU" dirty="0">
-                <a:latin typeface="JetBrains Mono" panose="020B0509020102050004" pitchFamily="49" charset="-52"/>
-              </a:rPr>
-              <a:t>Моделирование работы системы</a:t>
-            </a:r>
-            <a:endParaRPr lang="ru-BY" dirty="0">
-              <a:latin typeface="JetBrains Mono" panose="020B0509020102050004" pitchFamily="49" charset="-52"/>
-            </a:endParaRPr>
-          </a:p>
-        </p:txBody>
-      </p:sp>
-      <p:pic>
-        <p:nvPicPr>
-          <p:cNvPr id="5" name="Рисунок 4">
-            <a:extLst>
-              <a:ext uri="{FF2B5EF4-FFF2-40B4-BE49-F238E27FC236}">
-                <a16:creationId xmlns:a16="http://schemas.microsoft.com/office/drawing/2014/main" id="{54218F4D-B5F5-4837-80DE-7411E334895F}"/>
-              </a:ext>
-            </a:extLst>
-          </p:cNvPr>
-          <p:cNvPicPr>
-            <a:picLocks noChangeAspect="1"/>
-          </p:cNvPicPr>
-          <p:nvPr/>
-        </p:nvPicPr>
-        <p:blipFill>
-          <a:blip r:embed="rId2"/>
-          <a:stretch>
-            <a:fillRect/>
-          </a:stretch>
-        </p:blipFill>
-        <p:spPr>
-          <a:xfrm>
-            <a:off x="300275" y="2454113"/>
-            <a:ext cx="5380611" cy="3684176"/>
           </a:xfrm>
           <a:prstGeom prst="rect">
             <a:avLst/>
           </a:prstGeom>
         </p:spPr>
-      </p:pic>
-      <p:sp>
-        <p:nvSpPr>
-          <p:cNvPr id="8" name="TextBox 7">
-            <a:extLst>
-              <a:ext uri="{FF2B5EF4-FFF2-40B4-BE49-F238E27FC236}">
-                <a16:creationId xmlns:a16="http://schemas.microsoft.com/office/drawing/2014/main" id="{EAD4675A-0A94-453E-BEBA-398B1CBBCF78}"/>
-              </a:ext>
-            </a:extLst>
-          </p:cNvPr>
-          <p:cNvSpPr txBox="1"/>
-          <p:nvPr/>
-        </p:nvSpPr>
-        <p:spPr>
-          <a:xfrm>
-            <a:off x="996532" y="1543051"/>
-            <a:ext cx="6097554" cy="588238"/>
-          </a:xfrm>
-          <a:prstGeom prst="rect">
-            <a:avLst/>
-          </a:prstGeom>
-          <a:noFill/>
-        </p:spPr>
         <p:txBody>
-          <a:bodyPr wrap="square">
-            <a:spAutoFit/>
+          <a:bodyPr vert="horz" lIns="91440" tIns="45720" rIns="91440" bIns="45720" rtlCol="0" anchor="ctr">
+            <a:normAutofit/>
           </a:bodyPr>
-          <a:lstStyle/>
-          <a:p>
-            <a:pPr>
+          <a:lstStyle>
+            <a:lvl1pPr algn="l" defTabSz="914400" rtl="0" eaLnBrk="1" latinLnBrk="0" hangingPunct="1">
               <a:lnSpc>
-                <a:spcPct val="150000"/>
+                <a:spcPct val="90000"/>
               </a:lnSpc>
-            </a:pPr>
-            <a:r>
-              <a:rPr lang="ru-RU" sz="2400" dirty="0">
-                <a:latin typeface="JetBrains Mono" panose="020B0509020102050004" pitchFamily="49" charset="-52"/>
-              </a:rPr>
-              <a:t>Ввод номера телефона</a:t>
-            </a:r>
-          </a:p>
-        </p:txBody>
-      </p:sp>
-      <p:pic>
-        <p:nvPicPr>
-          <p:cNvPr id="10" name="Рисунок 9">
-            <a:extLst>
-              <a:ext uri="{FF2B5EF4-FFF2-40B4-BE49-F238E27FC236}">
-                <a16:creationId xmlns:a16="http://schemas.microsoft.com/office/drawing/2014/main" id="{E767F9A7-DEF9-4E46-A952-C9C8592C72AC}"/>
-              </a:ext>
-            </a:extLst>
-          </p:cNvPr>
-          <p:cNvPicPr>
-            <a:picLocks noChangeAspect="1"/>
-          </p:cNvPicPr>
-          <p:nvPr/>
-        </p:nvPicPr>
-        <p:blipFill rotWithShape="1">
-          <a:blip r:embed="rId3"/>
-          <a:srcRect t="15774"/>
-          <a:stretch/>
-        </p:blipFill>
-        <p:spPr>
-          <a:xfrm>
-            <a:off x="6096000" y="2431523"/>
-            <a:ext cx="5757823" cy="3706766"/>
-          </a:xfrm>
-          <a:prstGeom prst="rect">
-            <a:avLst/>
-          </a:prstGeom>
-        </p:spPr>
-      </p:pic>
-      <p:sp>
-        <p:nvSpPr>
-          <p:cNvPr id="13" name="TextBox 12">
-            <a:extLst>
-              <a:ext uri="{FF2B5EF4-FFF2-40B4-BE49-F238E27FC236}">
-                <a16:creationId xmlns:a16="http://schemas.microsoft.com/office/drawing/2014/main" id="{78070476-F7CE-44F3-BBD8-4A7D7DF3D8C9}"/>
-              </a:ext>
-            </a:extLst>
-          </p:cNvPr>
-          <p:cNvSpPr txBox="1"/>
-          <p:nvPr/>
-        </p:nvSpPr>
-        <p:spPr>
-          <a:xfrm>
-            <a:off x="7094086" y="1525839"/>
-            <a:ext cx="6097554" cy="588238"/>
-          </a:xfrm>
-          <a:prstGeom prst="rect">
-            <a:avLst/>
-          </a:prstGeom>
-          <a:noFill/>
-        </p:spPr>
-        <p:txBody>
-          <a:bodyPr wrap="square">
-            <a:spAutoFit/>
-          </a:bodyPr>
-          <a:lstStyle/>
-          <a:p>
-            <a:pPr>
-              <a:lnSpc>
-                <a:spcPct val="150000"/>
-              </a:lnSpc>
-            </a:pPr>
-            <a:r>
-              <a:rPr lang="ru-RU" sz="2400" dirty="0">
-                <a:latin typeface="JetBrains Mono" panose="020B0509020102050004" pitchFamily="49" charset="-52"/>
-              </a:rPr>
-              <a:t>Безопасная ситуация</a:t>
-            </a:r>
+              <a:spcBef>
+                <a:spcPct val="0"/>
+              </a:spcBef>
+              <a:buNone/>
+              <a:defRPr sz="4400" kern="1200">
+                <a:solidFill>
+                  <a:schemeClr val="tx1"/>
+                </a:solidFill>
+                <a:latin typeface="+mj-lt"/>
+                <a:ea typeface="+mj-ea"/>
+                <a:cs typeface="+mj-cs"/>
+              </a:defRPr>
+            </a:lvl1pPr>
+          </a:lstStyle>
+          <a:p>
+            <a:pPr algn="ctr"/>
+            <a:r>
+              <a:rPr lang="ru-RU" dirty="0">
+                <a:latin typeface="JetBrains Mono" panose="020B0509020102050004" pitchFamily="49" charset="-52"/>
+              </a:rPr>
+              <a:t>Программное обеспечение</a:t>
+            </a:r>
+            <a:endParaRPr lang="ru-BY" dirty="0">
+              <a:latin typeface="JetBrains Mono" panose="020B0509020102050004" pitchFamily="49" charset="-52"/>
+            </a:endParaRPr>
           </a:p>
         </p:txBody>
       </p:sp>
     </p:spTree>
     <p:extLst>
       <p:ext uri="{BB962C8B-B14F-4D97-AF65-F5344CB8AC3E}">
-        <p14:creationId xmlns:p14="http://schemas.microsoft.com/office/powerpoint/2010/main" val="2934228151"/>
+        <p14:creationId xmlns:p14="http://schemas.microsoft.com/office/powerpoint/2010/main" val="1581041747"/>
       </p:ext>
     </p:extLst>
   </p:cSld>
@@ -9011,7 +10225,7 @@
           <p:cNvPr id="2" name="Заголовок 1">
             <a:extLst>
               <a:ext uri="{FF2B5EF4-FFF2-40B4-BE49-F238E27FC236}">
-                <a16:creationId xmlns:a16="http://schemas.microsoft.com/office/drawing/2014/main" id="{4E440BA2-38E4-43E9-AC33-5E04489F6CCC}"/>
+                <a16:creationId xmlns:a16="http://schemas.microsoft.com/office/drawing/2014/main" id="{EAA94A8A-7EF0-46FE-9CC4-47849B8225F6}"/>
               </a:ext>
             </a:extLst>
           </p:cNvPr>
@@ -9024,7 +10238,7 @@
         </p:nvSpPr>
         <p:spPr>
           <a:xfrm>
-            <a:off x="838200" y="159851"/>
+            <a:off x="838200" y="150521"/>
             <a:ext cx="10515600" cy="1325563"/>
           </a:xfrm>
         </p:spPr>
@@ -9032,6 +10246,7 @@
           <a:bodyPr/>
           <a:lstStyle/>
           <a:p>
+            <a:pPr algn="ctr"/>
             <a:r>
               <a:rPr lang="ru-RU" dirty="0">
                 <a:latin typeface="JetBrains Mono" panose="020B0509020102050004" pitchFamily="49" charset="-52"/>
@@ -9044,15 +10259,15 @@
       </p:sp>
       <p:pic>
         <p:nvPicPr>
-          <p:cNvPr id="5" name="Объект 4">
-            <a:extLst>
-              <a:ext uri="{FF2B5EF4-FFF2-40B4-BE49-F238E27FC236}">
-                <a16:creationId xmlns:a16="http://schemas.microsoft.com/office/drawing/2014/main" id="{0959CB2D-C840-414D-A502-69E6A8C0C3FC}"/>
+          <p:cNvPr id="4" name="Объект 3">
+            <a:extLst>
+              <a:ext uri="{FF2B5EF4-FFF2-40B4-BE49-F238E27FC236}">
+                <a16:creationId xmlns:a16="http://schemas.microsoft.com/office/drawing/2014/main" id="{E9F8FA9B-CEE9-40B5-8DEA-4A490686C8C9}"/>
               </a:ext>
             </a:extLst>
           </p:cNvPr>
           <p:cNvPicPr>
-            <a:picLocks noGrp="1" noChangeAspect="1"/>
+            <a:picLocks noGrp="1"/>
           </p:cNvPicPr>
           <p:nvPr>
             <p:ph idx="1"/>
@@ -9066,176 +10281,18 @@
         </p:blipFill>
         <p:spPr>
           <a:xfrm>
-            <a:off x="317241" y="2404533"/>
-            <a:ext cx="4683967" cy="3410293"/>
-          </a:xfrm>
-        </p:spPr>
-      </p:pic>
-      <p:sp>
-        <p:nvSpPr>
-          <p:cNvPr id="6" name="TextBox 5">
-            <a:extLst>
-              <a:ext uri="{FF2B5EF4-FFF2-40B4-BE49-F238E27FC236}">
-                <a16:creationId xmlns:a16="http://schemas.microsoft.com/office/drawing/2014/main" id="{3E06257F-9240-4122-8C02-3BD68CC66601}"/>
-              </a:ext>
-            </a:extLst>
-          </p:cNvPr>
-          <p:cNvSpPr txBox="1"/>
-          <p:nvPr/>
-        </p:nvSpPr>
-        <p:spPr>
-          <a:xfrm>
-            <a:off x="1201804" y="1646189"/>
-            <a:ext cx="6097554" cy="588238"/>
-          </a:xfrm>
-          <a:prstGeom prst="rect">
-            <a:avLst/>
-          </a:prstGeom>
-          <a:noFill/>
-        </p:spPr>
-        <p:txBody>
-          <a:bodyPr wrap="square">
-            <a:spAutoFit/>
-          </a:bodyPr>
-          <a:lstStyle/>
-          <a:p>
-            <a:pPr>
-              <a:lnSpc>
-                <a:spcPct val="150000"/>
-              </a:lnSpc>
-            </a:pPr>
-            <a:r>
-              <a:rPr lang="ru-RU" sz="2400" dirty="0">
-                <a:latin typeface="JetBrains Mono" panose="020B0509020102050004" pitchFamily="49" charset="-52"/>
-              </a:rPr>
-              <a:t>Опасная ситуация</a:t>
-            </a:r>
-          </a:p>
-        </p:txBody>
-      </p:sp>
-      <p:pic>
-        <p:nvPicPr>
-          <p:cNvPr id="8" name="Рисунок 7">
-            <a:extLst>
-              <a:ext uri="{FF2B5EF4-FFF2-40B4-BE49-F238E27FC236}">
-                <a16:creationId xmlns:a16="http://schemas.microsoft.com/office/drawing/2014/main" id="{0EE9189D-1BD8-44BD-A647-C1DD77B078E0}"/>
-              </a:ext>
-            </a:extLst>
-          </p:cNvPr>
-          <p:cNvPicPr>
-            <a:picLocks noChangeAspect="1"/>
-          </p:cNvPicPr>
-          <p:nvPr/>
-        </p:nvPicPr>
-        <p:blipFill>
-          <a:blip r:embed="rId3"/>
-          <a:stretch>
-            <a:fillRect/>
-          </a:stretch>
-        </p:blipFill>
-        <p:spPr>
-          <a:xfrm>
-            <a:off x="5939791" y="3175499"/>
-            <a:ext cx="6062974" cy="1760395"/>
+            <a:off x="1955682" y="1629681"/>
+            <a:ext cx="8280636" cy="4705804"/>
           </a:xfrm>
           <a:prstGeom prst="rect">
             <a:avLst/>
           </a:prstGeom>
         </p:spPr>
       </p:pic>
-      <p:sp>
-        <p:nvSpPr>
-          <p:cNvPr id="9" name="TextBox 8">
-            <a:extLst>
-              <a:ext uri="{FF2B5EF4-FFF2-40B4-BE49-F238E27FC236}">
-                <a16:creationId xmlns:a16="http://schemas.microsoft.com/office/drawing/2014/main" id="{9AD95E8D-65FF-460F-A90D-FB70945E7921}"/>
-              </a:ext>
-            </a:extLst>
-          </p:cNvPr>
-          <p:cNvSpPr txBox="1"/>
-          <p:nvPr/>
-        </p:nvSpPr>
-        <p:spPr>
-          <a:xfrm>
-            <a:off x="7409773" y="2413862"/>
-            <a:ext cx="6097554" cy="588238"/>
-          </a:xfrm>
-          <a:prstGeom prst="rect">
-            <a:avLst/>
-          </a:prstGeom>
-          <a:noFill/>
-        </p:spPr>
-        <p:txBody>
-          <a:bodyPr wrap="square">
-            <a:spAutoFit/>
-          </a:bodyPr>
-          <a:lstStyle/>
-          <a:p>
-            <a:pPr>
-              <a:lnSpc>
-                <a:spcPct val="150000"/>
-              </a:lnSpc>
-            </a:pPr>
-            <a:r>
-              <a:rPr lang="en-US" sz="2400" dirty="0">
-                <a:latin typeface="JetBrains Mono" panose="020B0509020102050004" pitchFamily="49" charset="-52"/>
-              </a:rPr>
-              <a:t>SMS-</a:t>
-            </a:r>
-            <a:r>
-              <a:rPr lang="ru-RU" sz="2400" dirty="0">
-                <a:latin typeface="JetBrains Mono" panose="020B0509020102050004" pitchFamily="49" charset="-52"/>
-              </a:rPr>
-              <a:t>оповещение</a:t>
-            </a:r>
-          </a:p>
-        </p:txBody>
-      </p:sp>
-      <p:cxnSp>
-        <p:nvCxnSpPr>
-          <p:cNvPr id="11" name="Прямая со стрелкой 10">
-            <a:extLst>
-              <a:ext uri="{FF2B5EF4-FFF2-40B4-BE49-F238E27FC236}">
-                <a16:creationId xmlns:a16="http://schemas.microsoft.com/office/drawing/2014/main" id="{844B07CB-1016-4E59-BD4A-B22C3CDD0AB6}"/>
-              </a:ext>
-            </a:extLst>
-          </p:cNvPr>
-          <p:cNvCxnSpPr>
-            <a:cxnSpLocks/>
-          </p:cNvCxnSpPr>
-          <p:nvPr/>
-        </p:nvCxnSpPr>
-        <p:spPr>
-          <a:xfrm flipV="1">
-            <a:off x="5087944" y="4055695"/>
-            <a:ext cx="765110" cy="0"/>
-          </a:xfrm>
-          <a:prstGeom prst="straightConnector1">
-            <a:avLst/>
-          </a:prstGeom>
-          <a:ln w="31750">
-            <a:tailEnd type="triangle"/>
-          </a:ln>
-        </p:spPr>
-        <p:style>
-          <a:lnRef idx="1">
-            <a:schemeClr val="dk1"/>
-          </a:lnRef>
-          <a:fillRef idx="0">
-            <a:schemeClr val="dk1"/>
-          </a:fillRef>
-          <a:effectRef idx="0">
-            <a:schemeClr val="dk1"/>
-          </a:effectRef>
-          <a:fontRef idx="minor">
-            <a:schemeClr val="tx1"/>
-          </a:fontRef>
-        </p:style>
-      </p:cxnSp>
     </p:spTree>
     <p:extLst>
       <p:ext uri="{BB962C8B-B14F-4D97-AF65-F5344CB8AC3E}">
-        <p14:creationId xmlns:p14="http://schemas.microsoft.com/office/powerpoint/2010/main" val="3667956743"/>
+        <p14:creationId xmlns:p14="http://schemas.microsoft.com/office/powerpoint/2010/main" val="219489359"/>
       </p:ext>
     </p:extLst>
   </p:cSld>

</xml_diff>